<commit_message>
changed a few lines
</commit_message>
<xml_diff>
--- a/Access Control.pptx
+++ b/Access Control.pptx
@@ -129,6 +129,11 @@
       </a:defRPr>
     </a:lvl9pPr>
   </p:defaultTextStyle>
+  <p:extLst>
+    <p:ext uri="{EFAFB233-063F-42B5-8137-9DF3F51BA10A}">
+      <p15:sldGuideLst xmlns:p15="http://schemas.microsoft.com/office/powerpoint/2012/main"/>
+    </p:ext>
+  </p:extLst>
 </p:presentation>
 </file>
 
@@ -5508,8 +5513,13 @@
           <a:p>
             <a:r>
               <a:rPr lang="en-US" dirty="0"/>
-              <a:t>Access to those infrastructure brings Infrastructure Access Control which includes – physical, logical, border, communication mechanism, host security which continues monitoring with must generated response</a:t>
-            </a:r>
+              <a:t>Access to those infrastructure brings Infrastructure Access Control which includes – physical, logical, border, communication mechanism, host security which continues monitoring with must </a:t>
+            </a:r>
+            <a:r>
+              <a:rPr lang="en-US"/>
+              <a:t>generated response…</a:t>
+            </a:r>
+            <a:endParaRPr lang="en-US" dirty="0"/>
           </a:p>
         </p:txBody>
       </p:sp>

</xml_diff>

<commit_message>
User access control and Dwitys changes executed
</commit_message>
<xml_diff>
--- a/Access Control.pptx
+++ b/Access Control.pptx
@@ -23,28 +23,32 @@
     <p:sldId id="257" r:id="rId17"/>
     <p:sldId id="258" r:id="rId18"/>
     <p:sldId id="259" r:id="rId19"/>
-    <p:sldId id="260" r:id="rId20"/>
-    <p:sldId id="261" r:id="rId21"/>
-    <p:sldId id="262" r:id="rId22"/>
-    <p:sldId id="263" r:id="rId23"/>
-    <p:sldId id="264" r:id="rId24"/>
-    <p:sldId id="265" r:id="rId25"/>
-    <p:sldId id="266" r:id="rId26"/>
-    <p:sldId id="267" r:id="rId27"/>
-    <p:sldId id="268" r:id="rId28"/>
-    <p:sldId id="269" r:id="rId29"/>
-    <p:sldId id="270" r:id="rId30"/>
-    <p:sldId id="271" r:id="rId31"/>
-    <p:sldId id="272" r:id="rId32"/>
-    <p:sldId id="273" r:id="rId33"/>
-    <p:sldId id="274" r:id="rId34"/>
-    <p:sldId id="275" r:id="rId35"/>
-    <p:sldId id="276" r:id="rId36"/>
-    <p:sldId id="277" r:id="rId37"/>
-    <p:sldId id="278" r:id="rId38"/>
-    <p:sldId id="279" r:id="rId39"/>
-    <p:sldId id="280" r:id="rId40"/>
-    <p:sldId id="281" r:id="rId41"/>
+    <p:sldId id="264" r:id="rId20"/>
+    <p:sldId id="265" r:id="rId21"/>
+    <p:sldId id="266" r:id="rId22"/>
+    <p:sldId id="267" r:id="rId23"/>
+    <p:sldId id="268" r:id="rId24"/>
+    <p:sldId id="269" r:id="rId25"/>
+    <p:sldId id="270" r:id="rId26"/>
+    <p:sldId id="271" r:id="rId27"/>
+    <p:sldId id="272" r:id="rId28"/>
+    <p:sldId id="273" r:id="rId29"/>
+    <p:sldId id="274" r:id="rId30"/>
+    <p:sldId id="275" r:id="rId31"/>
+    <p:sldId id="276" r:id="rId32"/>
+    <p:sldId id="278" r:id="rId33"/>
+    <p:sldId id="279" r:id="rId34"/>
+    <p:sldId id="280" r:id="rId35"/>
+    <p:sldId id="281" r:id="rId36"/>
+    <p:sldId id="296" r:id="rId37"/>
+    <p:sldId id="297" r:id="rId38"/>
+    <p:sldId id="298" r:id="rId39"/>
+    <p:sldId id="299" r:id="rId40"/>
+    <p:sldId id="300" r:id="rId41"/>
+    <p:sldId id="301" r:id="rId42"/>
+    <p:sldId id="302" r:id="rId43"/>
+    <p:sldId id="303" r:id="rId44"/>
+    <p:sldId id="304" r:id="rId45"/>
   </p:sldIdLst>
   <p:sldSz cx="12192000" cy="6858000"/>
   <p:notesSz cx="6858000" cy="9144000"/>
@@ -395,7 +399,7 @@
           <a:p>
             <a:fld id="{9184DA70-C731-4C70-880D-CCD4705E623C}" type="datetime1">
               <a:rPr lang="en-US" smtClean="0"/>
-              <a:t>11/13/2022</a:t>
+              <a:t>11/16/2022</a:t>
             </a:fld>
             <a:endParaRPr lang="en-US" dirty="0"/>
           </a:p>
@@ -583,7 +587,7 @@
           <a:p>
             <a:fld id="{B612A279-0833-481D-8C56-F67FD0AC6C50}" type="datetime1">
               <a:rPr lang="en-US" smtClean="0"/>
-              <a:t>11/13/2022</a:t>
+              <a:t>11/16/2022</a:t>
             </a:fld>
             <a:endParaRPr lang="en-US" dirty="0"/>
           </a:p>
@@ -825,7 +829,7 @@
           <a:p>
             <a:fld id="{6587DA83-5663-4C9C-B9AA-0B40A3DAFF81}" type="datetime1">
               <a:rPr lang="en-US" smtClean="0"/>
-              <a:t>11/13/2022</a:t>
+              <a:t>11/16/2022</a:t>
             </a:fld>
             <a:endParaRPr lang="en-US" dirty="0"/>
           </a:p>
@@ -1013,7 +1017,7 @@
           <a:p>
             <a:fld id="{4BE1D723-8F53-4F53-90B0-1982A396982E}" type="datetime1">
               <a:rPr lang="en-US" smtClean="0"/>
-              <a:t>11/13/2022</a:t>
+              <a:t>11/16/2022</a:t>
             </a:fld>
             <a:endParaRPr lang="en-US" dirty="0"/>
           </a:p>
@@ -1386,7 +1390,7 @@
           <a:p>
             <a:fld id="{97669AF7-7BEB-44E4-9852-375E34362B5B}" type="datetime1">
               <a:rPr lang="en-US" smtClean="0"/>
-              <a:t>11/13/2022</a:t>
+              <a:t>11/16/2022</a:t>
             </a:fld>
             <a:endParaRPr lang="en-US" dirty="0"/>
           </a:p>
@@ -1641,7 +1645,7 @@
           <a:p>
             <a:fld id="{BAAAC38D-0552-4C82-B593-E6124DFADBE2}" type="datetime1">
               <a:rPr lang="en-US" smtClean="0"/>
-              <a:t>11/13/2022</a:t>
+              <a:t>11/16/2022</a:t>
             </a:fld>
             <a:endParaRPr lang="en-US" dirty="0"/>
           </a:p>
@@ -2038,7 +2042,7 @@
           <a:p>
             <a:fld id="{D9DF0F1C-5577-4ACB-BB62-DF8F3C494C7E}" type="datetime1">
               <a:rPr lang="en-US" smtClean="0"/>
-              <a:t>11/13/2022</a:t>
+              <a:t>11/16/2022</a:t>
             </a:fld>
             <a:endParaRPr lang="en-US" dirty="0"/>
           </a:p>
@@ -2174,7 +2178,7 @@
           <a:p>
             <a:fld id="{1775B394-D9F9-4F0C-B15D-605F45CB9E9F}" type="datetime1">
               <a:rPr lang="en-US" smtClean="0"/>
-              <a:t>11/13/2022</a:t>
+              <a:t>11/16/2022</a:t>
             </a:fld>
             <a:endParaRPr lang="en-US" dirty="0"/>
           </a:p>
@@ -2331,7 +2335,7 @@
           <a:p>
             <a:fld id="{39667345-2558-425A-8533-9BFDBCE15005}" type="datetime1">
               <a:rPr lang="en-US" smtClean="0"/>
-              <a:t>11/13/2022</a:t>
+              <a:t>11/16/2022</a:t>
             </a:fld>
             <a:endParaRPr lang="en-US" dirty="0"/>
           </a:p>
@@ -2660,7 +2664,7 @@
           <a:p>
             <a:fld id="{92BEA474-078D-4E9B-9B14-09A87B19DC46}" type="datetime1">
               <a:rPr lang="en-US" smtClean="0"/>
-              <a:t>11/13/2022</a:t>
+              <a:t>11/16/2022</a:t>
             </a:fld>
             <a:endParaRPr lang="en-US" dirty="0"/>
           </a:p>
@@ -3010,7 +3014,7 @@
           <a:p>
             <a:fld id="{4907D986-8816-4272-A432-0437A28A9828}" type="datetime1">
               <a:rPr lang="en-US" smtClean="0"/>
-              <a:t>11/13/2022</a:t>
+              <a:t>11/16/2022</a:t>
             </a:fld>
             <a:endParaRPr lang="en-US" dirty="0"/>
           </a:p>
@@ -3271,7 +3275,7 @@
           <a:p>
             <a:fld id="{62D6E202-B606-4609-B914-27C9371A1F6D}" type="datetime1">
               <a:rPr lang="en-US" smtClean="0"/>
-              <a:t>11/13/2022</a:t>
+              <a:t>11/16/2022</a:t>
             </a:fld>
             <a:endParaRPr lang="en-US" dirty="0"/>
           </a:p>
@@ -5674,19 +5678,20 @@
           <a:p>
             <a:r>
               <a:rPr lang="en-US" dirty="0"/>
-              <a:t>It is defined as interconnected group of host and devices which is mostly distributed to different locations and offices. </a:t>
-            </a:r>
-          </a:p>
-          <a:p>
-            <a:r>
-              <a:rPr lang="en-US" dirty="0"/>
-              <a:t>Access to those infrastructure brings Infrastructure Access Control which includes – physical, logical, border, communication mechanism, host security which continues monitoring with must </a:t>
-            </a:r>
-            <a:r>
-              <a:rPr lang="en-US"/>
-              <a:t>generated response…</a:t>
-            </a:r>
-            <a:endParaRPr lang="en-US" dirty="0"/>
+              <a:t>Infra-structure.</a:t>
+            </a:r>
+          </a:p>
+          <a:p>
+            <a:r>
+              <a:rPr lang="en-US" dirty="0"/>
+              <a:t>Giving access to those structure brings Infrastructure Access Control.</a:t>
+            </a:r>
+          </a:p>
+          <a:p>
+            <a:r>
+              <a:rPr lang="en-US" dirty="0"/>
+              <a:t>What types of controls are included?</a:t>
+            </a:r>
           </a:p>
         </p:txBody>
       </p:sp>
@@ -5826,24 +5831,19 @@
           <a:p>
             <a:r>
               <a:rPr lang="en-US" dirty="0"/>
-              <a:t>The process of logically classifying network resources, applications, and assets is known as network segmentation. The ability to implement different services, authentication requirements, and security measures is made possible through segmentation.</a:t>
-            </a:r>
-          </a:p>
-          <a:p>
-            <a:endParaRPr lang="en-US" dirty="0"/>
-          </a:p>
-          <a:p>
-            <a:pPr marL="0" indent="0">
-              <a:buNone/>
-            </a:pPr>
-            <a:r>
-              <a:rPr lang="en-US" dirty="0"/>
-              <a:t>Network segments includes the following types –</a:t>
-            </a:r>
-          </a:p>
-          <a:p>
-            <a:pPr marL="0" indent="0">
-              <a:buNone/>
+              <a:t>Network classification.</a:t>
+            </a:r>
+          </a:p>
+          <a:p>
+            <a:r>
+              <a:rPr lang="en-US" dirty="0"/>
+              <a:t>The ability to implement different services, authentication requirements, and security measures is made possible through segmentation.</a:t>
+            </a:r>
+          </a:p>
+          <a:p>
+            <a:pPr>
+              <a:buFont typeface="Arial" panose="020B0604020202020204" pitchFamily="34" charset="0"/>
+              <a:buChar char="•"/>
             </a:pPr>
             <a:endParaRPr lang="en-US" dirty="0"/>
           </a:p>
@@ -5902,7 +5902,7 @@
           <a:p>
             <a:r>
               <a:rPr lang="en-US" dirty="0"/>
-              <a:t>Enclave Network</a:t>
+              <a:t>Segmented Network Types</a:t>
             </a:r>
           </a:p>
         </p:txBody>
@@ -5928,15 +5928,56 @@
           <a:bodyPr/>
           <a:lstStyle/>
           <a:p>
-            <a:r>
-              <a:rPr lang="en-US" dirty="0"/>
-              <a:t>It is a segment of an internal network which requires higher degree of protection. Internal accessibility is restricted through firewalls, VPNs, VLANs and network control devices.</a:t>
-            </a:r>
-          </a:p>
-          <a:p>
-            <a:r>
-              <a:rPr lang="en-US" dirty="0"/>
-              <a:t> </a:t>
+            <a:endParaRPr lang="en-US" dirty="0"/>
+          </a:p>
+          <a:p>
+            <a:pPr>
+              <a:buFont typeface="Arial" panose="020B0604020202020204" pitchFamily="34" charset="0"/>
+              <a:buChar char="•"/>
+            </a:pPr>
+            <a:r>
+              <a:rPr lang="en-US" dirty="0"/>
+              <a:t> Enclave network</a:t>
+            </a:r>
+          </a:p>
+          <a:p>
+            <a:pPr>
+              <a:buFont typeface="Arial" panose="020B0604020202020204" pitchFamily="34" charset="0"/>
+              <a:buChar char="•"/>
+            </a:pPr>
+            <a:r>
+              <a:rPr lang="en-US" dirty="0"/>
+              <a:t>Trusted Network (Wired/Wireless)</a:t>
+            </a:r>
+          </a:p>
+          <a:p>
+            <a:pPr>
+              <a:buFont typeface="Arial" panose="020B0604020202020204" pitchFamily="34" charset="0"/>
+              <a:buChar char="•"/>
+            </a:pPr>
+            <a:r>
+              <a:rPr lang="en-US" dirty="0"/>
+              <a:t>Semi Trusted Network</a:t>
+            </a:r>
+          </a:p>
+          <a:p>
+            <a:pPr>
+              <a:buFont typeface="Arial" panose="020B0604020202020204" pitchFamily="34" charset="0"/>
+              <a:buChar char="•"/>
+            </a:pPr>
+            <a:r>
+              <a:rPr lang="en-US" dirty="0"/>
+              <a:t>Guest Network</a:t>
+            </a:r>
+          </a:p>
+          <a:p>
+            <a:pPr>
+              <a:buFont typeface="Arial" panose="020B0604020202020204" pitchFamily="34" charset="0"/>
+              <a:buChar char="•"/>
+            </a:pPr>
+            <a:r>
+              <a:rPr lang="en-US" dirty="0"/>
+              <a:t>Untrusted Network</a:t>
             </a:r>
           </a:p>
         </p:txBody>
@@ -5976,7 +6017,7 @@
           <p:cNvPr id="2" name="Title 1">
             <a:extLst>
               <a:ext uri="{FF2B5EF4-FFF2-40B4-BE49-F238E27FC236}">
-                <a16:creationId xmlns:a16="http://schemas.microsoft.com/office/drawing/2014/main" id="{71C1A799-2565-C283-F455-67628F70ABE6}"/>
+                <a16:creationId xmlns:a16="http://schemas.microsoft.com/office/drawing/2014/main" id="{EFFF7A0A-A67B-1D0E-71E7-003374DEE151}"/>
               </a:ext>
             </a:extLst>
           </p:cNvPr>
@@ -5994,7 +6035,7 @@
           <a:p>
             <a:r>
               <a:rPr lang="en-US" dirty="0"/>
-              <a:t>Trusted Network (Wired / Wireless)</a:t>
+              <a:t>Technologies used to segment a Network</a:t>
             </a:r>
           </a:p>
         </p:txBody>
@@ -6004,7 +6045,7 @@
           <p:cNvPr id="3" name="Content Placeholder 2">
             <a:extLst>
               <a:ext uri="{FF2B5EF4-FFF2-40B4-BE49-F238E27FC236}">
-                <a16:creationId xmlns:a16="http://schemas.microsoft.com/office/drawing/2014/main" id="{AAD978A1-BF14-03C8-5952-CFF36EFE8312}"/>
+                <a16:creationId xmlns:a16="http://schemas.microsoft.com/office/drawing/2014/main" id="{77B5DDC1-34B0-C8FD-6D90-CB3D47E2E2A4}"/>
               </a:ext>
             </a:extLst>
           </p:cNvPr>
@@ -6022,7 +6063,35 @@
           <a:p>
             <a:r>
               <a:rPr lang="en-US" dirty="0"/>
-              <a:t>Internal network is accessible to authorized user only. External accessibility is restricted to the use of firewalls, VPNs, IDS, IPS. Internal accessibility may be restricted to VLANs and NAC devices.</a:t>
+              <a:t>Virtual LANs (VLANs)</a:t>
+            </a:r>
+          </a:p>
+          <a:p>
+            <a:r>
+              <a:rPr lang="en-US" dirty="0"/>
+              <a:t>Security Group Tagging (SGT)</a:t>
+            </a:r>
+          </a:p>
+          <a:p>
+            <a:r>
+              <a:rPr lang="en-US" dirty="0"/>
+              <a:t>VPN Routing and Forwarding (VRF)</a:t>
+            </a:r>
+          </a:p>
+          <a:p>
+            <a:r>
+              <a:rPr lang="en-US" dirty="0" err="1"/>
+              <a:t>vMicro</a:t>
+            </a:r>
+            <a:r>
+              <a:rPr lang="en-US" dirty="0"/>
+              <a:t>-segmentation at the virtual machine level</a:t>
+            </a:r>
+          </a:p>
+          <a:p>
+            <a:r>
+              <a:rPr lang="en-US" dirty="0"/>
+              <a:t>Micro-segmentation for containers</a:t>
             </a:r>
           </a:p>
         </p:txBody>
@@ -6030,7 +6099,7 @@
     </p:spTree>
     <p:extLst>
       <p:ext uri="{BB962C8B-B14F-4D97-AF65-F5344CB8AC3E}">
-        <p14:creationId xmlns:p14="http://schemas.microsoft.com/office/powerpoint/2010/main" val="1832873125"/>
+        <p14:creationId xmlns:p14="http://schemas.microsoft.com/office/powerpoint/2010/main" val="2652937463"/>
       </p:ext>
     </p:extLst>
   </p:cSld>
@@ -6243,7 +6312,7 @@
           <p:cNvPr id="2" name="Title 1">
             <a:extLst>
               <a:ext uri="{FF2B5EF4-FFF2-40B4-BE49-F238E27FC236}">
-                <a16:creationId xmlns:a16="http://schemas.microsoft.com/office/drawing/2014/main" id="{5D72A087-EAAD-5DED-9F1E-9A285CACF9E2}"/>
+                <a16:creationId xmlns:a16="http://schemas.microsoft.com/office/drawing/2014/main" id="{5C73ED6D-769B-D413-0EE0-9992095CB79D}"/>
               </a:ext>
             </a:extLst>
           </p:cNvPr>
@@ -6261,7 +6330,7 @@
           <a:p>
             <a:r>
               <a:rPr lang="en-US" dirty="0"/>
-              <a:t>Semi Trusted Network</a:t>
+              <a:t>Layered border security</a:t>
             </a:r>
           </a:p>
         </p:txBody>
@@ -6271,7 +6340,7 @@
           <p:cNvPr id="3" name="Content Placeholder 2">
             <a:extLst>
               <a:ext uri="{FF2B5EF4-FFF2-40B4-BE49-F238E27FC236}">
-                <a16:creationId xmlns:a16="http://schemas.microsoft.com/office/drawing/2014/main" id="{D05042AB-0CFC-2E9E-08E2-D5BD635CEA1D}"/>
+                <a16:creationId xmlns:a16="http://schemas.microsoft.com/office/drawing/2014/main" id="{39E430E2-77DC-9A08-D6A2-D091D10F7458}"/>
               </a:ext>
             </a:extLst>
           </p:cNvPr>
@@ -6289,7 +6358,19 @@
           <a:p>
             <a:r>
               <a:rPr lang="en-US" dirty="0"/>
-              <a:t>It is designed to be internet accessible. Hosts are generally located in DMZ. Internal and external accessibility is restricted through the use of firewalls, VPNs, IDS, and IPS.</a:t>
+              <a:t>Layer security</a:t>
+            </a:r>
+          </a:p>
+          <a:p>
+            <a:r>
+              <a:rPr lang="en-US" dirty="0"/>
+              <a:t>Layered border security</a:t>
+            </a:r>
+          </a:p>
+          <a:p>
+            <a:r>
+              <a:rPr lang="en-US" dirty="0"/>
+              <a:t>It includes controls like firewalls</a:t>
             </a:r>
           </a:p>
         </p:txBody>
@@ -6297,7 +6378,7 @@
     </p:spTree>
     <p:extLst>
       <p:ext uri="{BB962C8B-B14F-4D97-AF65-F5344CB8AC3E}">
-        <p14:creationId xmlns:p14="http://schemas.microsoft.com/office/powerpoint/2010/main" val="896153566"/>
+        <p14:creationId xmlns:p14="http://schemas.microsoft.com/office/powerpoint/2010/main" val="2937805561"/>
       </p:ext>
     </p:extLst>
   </p:cSld>
@@ -6329,7 +6410,7 @@
           <p:cNvPr id="2" name="Title 1">
             <a:extLst>
               <a:ext uri="{FF2B5EF4-FFF2-40B4-BE49-F238E27FC236}">
-                <a16:creationId xmlns:a16="http://schemas.microsoft.com/office/drawing/2014/main" id="{C20FDD76-6D5E-7D28-7EF0-CD60FB9D4E63}"/>
+                <a16:creationId xmlns:a16="http://schemas.microsoft.com/office/drawing/2014/main" id="{F99909C3-139A-80AF-4E93-1E5DF6352094}"/>
               </a:ext>
             </a:extLst>
           </p:cNvPr>
@@ -6347,7 +6428,7 @@
           <a:p>
             <a:r>
               <a:rPr lang="en-US" dirty="0"/>
-              <a:t>Guest Network</a:t>
+              <a:t>Firewalls</a:t>
             </a:r>
           </a:p>
         </p:txBody>
@@ -6357,7 +6438,7 @@
           <p:cNvPr id="3" name="Content Placeholder 2">
             <a:extLst>
               <a:ext uri="{FF2B5EF4-FFF2-40B4-BE49-F238E27FC236}">
-                <a16:creationId xmlns:a16="http://schemas.microsoft.com/office/drawing/2014/main" id="{20D0E2E7-C8C5-BF36-C11F-56602DBF2FE0}"/>
+                <a16:creationId xmlns:a16="http://schemas.microsoft.com/office/drawing/2014/main" id="{6B8A64D5-D098-13B7-54B8-0388CF65613C}"/>
               </a:ext>
             </a:extLst>
           </p:cNvPr>
@@ -6375,7 +6456,13 @@
           <a:p>
             <a:r>
               <a:rPr lang="en-US" dirty="0"/>
-              <a:t>It is specifically designed for the use of visitors to connect to the internet. There is no access from guest network to trusted network.</a:t>
+              <a:t>It controls the flow of traffic in the network which is mandatory. Without firewalls, the network is completely exposed and can be compromised.</a:t>
+            </a:r>
+          </a:p>
+          <a:p>
+            <a:r>
+              <a:rPr lang="en-US" dirty="0"/>
+              <a:t>Firewalls are handled and configured with procedures and rule sets to control incoming and outgoing traffic.</a:t>
             </a:r>
           </a:p>
         </p:txBody>
@@ -6383,7 +6470,7 @@
     </p:spTree>
     <p:extLst>
       <p:ext uri="{BB962C8B-B14F-4D97-AF65-F5344CB8AC3E}">
-        <p14:creationId xmlns:p14="http://schemas.microsoft.com/office/powerpoint/2010/main" val="1917718120"/>
+        <p14:creationId xmlns:p14="http://schemas.microsoft.com/office/powerpoint/2010/main" val="1627068461"/>
       </p:ext>
     </p:extLst>
   </p:cSld>
@@ -6415,7 +6502,7 @@
           <p:cNvPr id="2" name="Title 1">
             <a:extLst>
               <a:ext uri="{FF2B5EF4-FFF2-40B4-BE49-F238E27FC236}">
-                <a16:creationId xmlns:a16="http://schemas.microsoft.com/office/drawing/2014/main" id="{F9E30B7C-B942-2211-BEBA-CB296AD643C8}"/>
+                <a16:creationId xmlns:a16="http://schemas.microsoft.com/office/drawing/2014/main" id="{FD92074A-4F16-148E-EEDD-19D11A48C338}"/>
               </a:ext>
             </a:extLst>
           </p:cNvPr>
@@ -6433,7 +6520,7 @@
           <a:p>
             <a:r>
               <a:rPr lang="en-US" dirty="0"/>
-              <a:t>Untrusted Network</a:t>
+              <a:t>The process used to allow or block traffic includes:</a:t>
             </a:r>
           </a:p>
         </p:txBody>
@@ -6443,7 +6530,7 @@
           <p:cNvPr id="3" name="Content Placeholder 2">
             <a:extLst>
               <a:ext uri="{FF2B5EF4-FFF2-40B4-BE49-F238E27FC236}">
-                <a16:creationId xmlns:a16="http://schemas.microsoft.com/office/drawing/2014/main" id="{25CA6469-D697-F84B-52E7-C36F2846AA81}"/>
+                <a16:creationId xmlns:a16="http://schemas.microsoft.com/office/drawing/2014/main" id="{FE390902-5863-3AE1-1B7B-78F9366FE517}"/>
               </a:ext>
             </a:extLst>
           </p:cNvPr>
@@ -6461,7 +6548,47 @@
           <a:p>
             <a:r>
               <a:rPr lang="en-US" dirty="0"/>
-              <a:t>A  network outside of security control.</a:t>
+              <a:t>Simple packet filtering techniques</a:t>
+            </a:r>
+          </a:p>
+          <a:p>
+            <a:pPr>
+              <a:buFont typeface="Arial" panose="020B0604020202020204" pitchFamily="34" charset="0"/>
+              <a:buChar char="•"/>
+            </a:pPr>
+            <a:r>
+              <a:rPr lang="en-US" dirty="0"/>
+              <a:t>Application Proxies</a:t>
+            </a:r>
+          </a:p>
+          <a:p>
+            <a:pPr>
+              <a:buFont typeface="Arial" panose="020B0604020202020204" pitchFamily="34" charset="0"/>
+              <a:buChar char="•"/>
+            </a:pPr>
+            <a:r>
+              <a:rPr lang="en-US" dirty="0"/>
+              <a:t>NAT</a:t>
+            </a:r>
+          </a:p>
+          <a:p>
+            <a:pPr>
+              <a:buFont typeface="Arial" panose="020B0604020202020204" pitchFamily="34" charset="0"/>
+              <a:buChar char="•"/>
+            </a:pPr>
+            <a:r>
+              <a:rPr lang="en-US" dirty="0"/>
+              <a:t>Stateful inspection firewalls</a:t>
+            </a:r>
+          </a:p>
+          <a:p>
+            <a:pPr>
+              <a:buFont typeface="Arial" panose="020B0604020202020204" pitchFamily="34" charset="0"/>
+              <a:buChar char="•"/>
+            </a:pPr>
+            <a:r>
+              <a:rPr lang="en-US" dirty="0"/>
+              <a:t>Next-gen context-aware firewalls</a:t>
             </a:r>
           </a:p>
         </p:txBody>
@@ -6469,7 +6596,7 @@
     </p:spTree>
     <p:extLst>
       <p:ext uri="{BB962C8B-B14F-4D97-AF65-F5344CB8AC3E}">
-        <p14:creationId xmlns:p14="http://schemas.microsoft.com/office/powerpoint/2010/main" val="3759214303"/>
+        <p14:creationId xmlns:p14="http://schemas.microsoft.com/office/powerpoint/2010/main" val="3310384940"/>
       </p:ext>
     </p:extLst>
   </p:cSld>
@@ -6501,7 +6628,7 @@
           <p:cNvPr id="2" name="Title 1">
             <a:extLst>
               <a:ext uri="{FF2B5EF4-FFF2-40B4-BE49-F238E27FC236}">
-                <a16:creationId xmlns:a16="http://schemas.microsoft.com/office/drawing/2014/main" id="{EFFF7A0A-A67B-1D0E-71E7-003374DEE151}"/>
+                <a16:creationId xmlns:a16="http://schemas.microsoft.com/office/drawing/2014/main" id="{3C97B136-A603-4A44-D031-4B88EDC11EAF}"/>
               </a:ext>
             </a:extLst>
           </p:cNvPr>
@@ -6519,7 +6646,7 @@
           <a:p>
             <a:r>
               <a:rPr lang="en-US" dirty="0"/>
-              <a:t>Technologies used to segment a Network</a:t>
+              <a:t>Intrusion Detection and Prevention</a:t>
             </a:r>
           </a:p>
         </p:txBody>
@@ -6529,7 +6656,7 @@
           <p:cNvPr id="3" name="Content Placeholder 2">
             <a:extLst>
               <a:ext uri="{FF2B5EF4-FFF2-40B4-BE49-F238E27FC236}">
-                <a16:creationId xmlns:a16="http://schemas.microsoft.com/office/drawing/2014/main" id="{77B5DDC1-34B0-C8FD-6D90-CB3D47E2E2A4}"/>
+                <a16:creationId xmlns:a16="http://schemas.microsoft.com/office/drawing/2014/main" id="{D321A911-79A8-3089-B204-4E47D2EE3FB8}"/>
               </a:ext>
             </a:extLst>
           </p:cNvPr>
@@ -6547,35 +6674,25 @@
           <a:p>
             <a:r>
               <a:rPr lang="en-US" dirty="0"/>
-              <a:t>Virtual LANs (VLANs)</a:t>
-            </a:r>
-          </a:p>
-          <a:p>
-            <a:r>
-              <a:rPr lang="en-US" dirty="0"/>
-              <a:t>Security Group Tagging (SGT)</a:t>
-            </a:r>
-          </a:p>
-          <a:p>
-            <a:r>
-              <a:rPr lang="en-US" dirty="0"/>
-              <a:t>VPN Routing and Forwarding (VRF)</a:t>
-            </a:r>
-          </a:p>
-          <a:p>
-            <a:r>
-              <a:rPr lang="en-US" dirty="0" err="1"/>
-              <a:t>vMicro</a:t>
-            </a:r>
-            <a:r>
-              <a:rPr lang="en-US" dirty="0"/>
-              <a:t>-segmentation at the virtual machine level</a:t>
-            </a:r>
-          </a:p>
-          <a:p>
-            <a:r>
-              <a:rPr lang="en-US" dirty="0"/>
-              <a:t>Micro-segmentation for containers</a:t>
+              <a:t>When malicious activities masquerade legitimate traffic these are used</a:t>
+            </a:r>
+          </a:p>
+          <a:p>
+            <a:r>
+              <a:rPr lang="en-US" dirty="0"/>
+              <a:t>IDS is a passive to analyze traffic to detect unauthorized access, and stressful protocol analysis and if it detects anything IDS generates an email, message or text alert.</a:t>
+            </a:r>
+          </a:p>
+          <a:p>
+            <a:endParaRPr lang="en-US" dirty="0"/>
+          </a:p>
+          <a:p>
+            <a:pPr marL="0" indent="0">
+              <a:buNone/>
+            </a:pPr>
+            <a:r>
+              <a:rPr lang="en-US" dirty="0"/>
+              <a:t>IPS is an active device which seats in line with traffic and responds to identify threads by disabling connection, dropping packets or deleting malicious content.</a:t>
             </a:r>
           </a:p>
         </p:txBody>
@@ -6583,7 +6700,7 @@
     </p:spTree>
     <p:extLst>
       <p:ext uri="{BB962C8B-B14F-4D97-AF65-F5344CB8AC3E}">
-        <p14:creationId xmlns:p14="http://schemas.microsoft.com/office/powerpoint/2010/main" val="2652937463"/>
+        <p14:creationId xmlns:p14="http://schemas.microsoft.com/office/powerpoint/2010/main" val="641647791"/>
       </p:ext>
     </p:extLst>
   </p:cSld>
@@ -6615,7 +6732,7 @@
           <p:cNvPr id="2" name="Title 1">
             <a:extLst>
               <a:ext uri="{FF2B5EF4-FFF2-40B4-BE49-F238E27FC236}">
-                <a16:creationId xmlns:a16="http://schemas.microsoft.com/office/drawing/2014/main" id="{5C73ED6D-769B-D413-0EE0-9992095CB79D}"/>
+                <a16:creationId xmlns:a16="http://schemas.microsoft.com/office/drawing/2014/main" id="{83E6490C-B842-544D-F467-2C1996586976}"/>
               </a:ext>
             </a:extLst>
           </p:cNvPr>
@@ -6633,7 +6750,7 @@
           <a:p>
             <a:r>
               <a:rPr lang="en-US" dirty="0"/>
-              <a:t>Layered border security</a:t>
+              <a:t>Technologies used by IDS/IPS</a:t>
             </a:r>
           </a:p>
         </p:txBody>
@@ -6643,7 +6760,7 @@
           <p:cNvPr id="3" name="Content Placeholder 2">
             <a:extLst>
               <a:ext uri="{FF2B5EF4-FFF2-40B4-BE49-F238E27FC236}">
-                <a16:creationId xmlns:a16="http://schemas.microsoft.com/office/drawing/2014/main" id="{39E430E2-77DC-9A08-D6A2-D091D10F7458}"/>
+                <a16:creationId xmlns:a16="http://schemas.microsoft.com/office/drawing/2014/main" id="{FC39A5D6-6977-8E39-6950-F696BF2696F3}"/>
               </a:ext>
             </a:extLst>
           </p:cNvPr>
@@ -6659,23 +6776,66 @@
           <a:bodyPr/>
           <a:lstStyle/>
           <a:p>
-            <a:r>
-              <a:rPr lang="en-US" dirty="0"/>
-              <a:t>Layer security: Different security measures to work in tandem with a single focus.</a:t>
-            </a:r>
-          </a:p>
-          <a:p>
-            <a:r>
-              <a:rPr lang="en-US" dirty="0"/>
-              <a:t>Layered border security: Protection of the internal network from external controls. Which includes the controls like firewalls, VPNs, IDS, and IPS.</a:t>
-            </a:r>
+            <a:pPr marL="457200" indent="-457200">
+              <a:buFont typeface="+mj-lt"/>
+              <a:buAutoNum type="arabicPeriod"/>
+            </a:pPr>
+            <a:r>
+              <a:rPr lang="en-US" dirty="0"/>
+              <a:t>Network-based: Monitors network traffic for a specific segment, and device and analyze activities.</a:t>
+            </a:r>
+          </a:p>
+          <a:p>
+            <a:pPr marL="457200" indent="-457200">
+              <a:buFont typeface="+mj-lt"/>
+              <a:buAutoNum type="arabicPeriod"/>
+            </a:pPr>
+            <a:r>
+              <a:rPr lang="en-US" dirty="0"/>
+              <a:t>Wireless IDS/IPS: Monitors wireless network traffic and analyzes activities and protocols.</a:t>
+            </a:r>
+          </a:p>
+          <a:p>
+            <a:pPr marL="457200" indent="-457200">
+              <a:buFont typeface="+mj-lt"/>
+              <a:buAutoNum type="arabicPeriod"/>
+            </a:pPr>
+            <a:r>
+              <a:rPr lang="en-US" dirty="0"/>
+              <a:t>Network </a:t>
+            </a:r>
+            <a:r>
+              <a:rPr lang="en-US" dirty="0" err="1"/>
+              <a:t>behavioural</a:t>
+            </a:r>
+            <a:r>
+              <a:rPr lang="en-US" dirty="0"/>
+              <a:t> analysis: It examines the traffic to identify threats, information flow, DDOS, malware and policy violations.</a:t>
+            </a:r>
+          </a:p>
+          <a:p>
+            <a:pPr marL="457200" indent="-457200">
+              <a:buFont typeface="+mj-lt"/>
+              <a:buAutoNum type="arabicPeriod"/>
+            </a:pPr>
+            <a:r>
+              <a:rPr lang="en-US" dirty="0"/>
+              <a:t>Host-based IDS/IPS: It monitors every single host and its events.</a:t>
+            </a:r>
+          </a:p>
+          <a:p>
+            <a:pPr marL="457200" indent="-457200">
+              <a:buFont typeface="+mj-lt"/>
+              <a:buAutoNum type="arabicPeriod"/>
+            </a:pPr>
+            <a:endParaRPr lang="en-US" dirty="0"/>
           </a:p>
         </p:txBody>
       </p:sp>
     </p:spTree>
     <p:extLst>
       <p:ext uri="{BB962C8B-B14F-4D97-AF65-F5344CB8AC3E}">
-        <p14:creationId xmlns:p14="http://schemas.microsoft.com/office/powerpoint/2010/main" val="2937805561"/>
+        <p14:creationId xmlns:p14="http://schemas.microsoft.com/office/powerpoint/2010/main" val="211107562"/>
       </p:ext>
     </p:extLst>
   </p:cSld>
@@ -6707,7 +6867,7 @@
           <p:cNvPr id="2" name="Title 1">
             <a:extLst>
               <a:ext uri="{FF2B5EF4-FFF2-40B4-BE49-F238E27FC236}">
-                <a16:creationId xmlns:a16="http://schemas.microsoft.com/office/drawing/2014/main" id="{F99909C3-139A-80AF-4E93-1E5DF6352094}"/>
+                <a16:creationId xmlns:a16="http://schemas.microsoft.com/office/drawing/2014/main" id="{528D3DEA-CE54-A793-9FEA-A36FA50D63D5}"/>
               </a:ext>
             </a:extLst>
           </p:cNvPr>
@@ -6725,7 +6885,7 @@
           <a:p>
             <a:r>
               <a:rPr lang="en-US" dirty="0"/>
-              <a:t>Firewalls</a:t>
+              <a:t>Decision States</a:t>
             </a:r>
           </a:p>
         </p:txBody>
@@ -6735,7 +6895,7 @@
           <p:cNvPr id="3" name="Content Placeholder 2">
             <a:extLst>
               <a:ext uri="{FF2B5EF4-FFF2-40B4-BE49-F238E27FC236}">
-                <a16:creationId xmlns:a16="http://schemas.microsoft.com/office/drawing/2014/main" id="{6B8A64D5-D098-13B7-54B8-0388CF65613C}"/>
+                <a16:creationId xmlns:a16="http://schemas.microsoft.com/office/drawing/2014/main" id="{13B76399-18A5-36FB-2373-DB31B8662B7C}"/>
               </a:ext>
             </a:extLst>
           </p:cNvPr>
@@ -6751,15 +6911,43 @@
           <a:bodyPr/>
           <a:lstStyle/>
           <a:p>
-            <a:r>
-              <a:rPr lang="en-US" dirty="0"/>
-              <a:t>It controls the flow of traffic in the network which is mandatory. Without firewalls, the network is completely exposed and can be compromised.</a:t>
-            </a:r>
-          </a:p>
-          <a:p>
-            <a:r>
-              <a:rPr lang="en-US" dirty="0"/>
-              <a:t>Firewalls are handled and configured with procedures and rule sets to control incoming and outgoing traffic.</a:t>
+            <a:pPr marL="457200" indent="-457200">
+              <a:buFont typeface="+mj-lt"/>
+              <a:buAutoNum type="arabicPeriod"/>
+            </a:pPr>
+            <a:r>
+              <a:rPr lang="en-US" dirty="0"/>
+              <a:t>True positive:  It correctly identifies an issue.</a:t>
+            </a:r>
+          </a:p>
+          <a:p>
+            <a:pPr marL="457200" indent="-457200">
+              <a:buFont typeface="+mj-lt"/>
+              <a:buAutoNum type="arabicPeriod"/>
+            </a:pPr>
+            <a:r>
+              <a:rPr lang="en-US" dirty="0"/>
+              <a:t>True Negative: It correctly identifies normal traffic.</a:t>
+            </a:r>
+          </a:p>
+          <a:p>
+            <a:pPr marL="457200" indent="-457200">
+              <a:buFont typeface="+mj-lt"/>
+              <a:buAutoNum type="arabicPeriod"/>
+            </a:pPr>
+            <a:r>
+              <a:rPr lang="en-US" dirty="0"/>
+              <a:t>False Positive: Incorrectly identifies normal activity as an issue</a:t>
+            </a:r>
+          </a:p>
+          <a:p>
+            <a:pPr marL="457200" indent="-457200">
+              <a:buFont typeface="+mj-lt"/>
+              <a:buAutoNum type="arabicPeriod"/>
+            </a:pPr>
+            <a:r>
+              <a:rPr lang="en-US" dirty="0"/>
+              <a:t>False Negative: Incorrectly identifies an issue as normal activity.</a:t>
             </a:r>
           </a:p>
         </p:txBody>
@@ -6767,7 +6955,7 @@
     </p:spTree>
     <p:extLst>
       <p:ext uri="{BB962C8B-B14F-4D97-AF65-F5344CB8AC3E}">
-        <p14:creationId xmlns:p14="http://schemas.microsoft.com/office/powerpoint/2010/main" val="1627068461"/>
+        <p14:creationId xmlns:p14="http://schemas.microsoft.com/office/powerpoint/2010/main" val="2688818695"/>
       </p:ext>
     </p:extLst>
   </p:cSld>
@@ -6799,7 +6987,7 @@
           <p:cNvPr id="2" name="Title 1">
             <a:extLst>
               <a:ext uri="{FF2B5EF4-FFF2-40B4-BE49-F238E27FC236}">
-                <a16:creationId xmlns:a16="http://schemas.microsoft.com/office/drawing/2014/main" id="{FD92074A-4F16-148E-EEDD-19D11A48C338}"/>
+                <a16:creationId xmlns:a16="http://schemas.microsoft.com/office/drawing/2014/main" id="{F646DBC6-A618-85D6-A6DE-A4F22A157E52}"/>
               </a:ext>
             </a:extLst>
           </p:cNvPr>
@@ -6817,7 +7005,7 @@
           <a:p>
             <a:r>
               <a:rPr lang="en-US" dirty="0"/>
-              <a:t>The process used to allow or block traffic includes:</a:t>
+              <a:t>Network-Based IDS/IPS uses these detection methodologies</a:t>
             </a:r>
           </a:p>
         </p:txBody>
@@ -6827,7 +7015,7 @@
           <p:cNvPr id="3" name="Content Placeholder 2">
             <a:extLst>
               <a:ext uri="{FF2B5EF4-FFF2-40B4-BE49-F238E27FC236}">
-                <a16:creationId xmlns:a16="http://schemas.microsoft.com/office/drawing/2014/main" id="{FE390902-5863-3AE1-1B7B-78F9366FE517}"/>
+                <a16:creationId xmlns:a16="http://schemas.microsoft.com/office/drawing/2014/main" id="{B156CA4E-E1F2-C33F-7F5B-DF71D9E85F7F}"/>
               </a:ext>
             </a:extLst>
           </p:cNvPr>
@@ -6842,12 +7030,6 @@
         <p:txBody>
           <a:bodyPr/>
           <a:lstStyle/>
-          <a:p>
-            <a:r>
-              <a:rPr lang="en-US" dirty="0"/>
-              <a:t>Simple packet filtering techniques</a:t>
-            </a:r>
-          </a:p>
           <a:p>
             <a:pPr>
               <a:buFont typeface="Arial" panose="020B0604020202020204" pitchFamily="34" charset="0"/>
@@ -6855,7 +7037,7 @@
             </a:pPr>
             <a:r>
               <a:rPr lang="en-US" dirty="0"/>
-              <a:t>Application Proxies</a:t>
+              <a:t>Pattern matching and stateful pattern matching recognition</a:t>
             </a:r>
           </a:p>
           <a:p>
@@ -6865,7 +7047,7 @@
             </a:pPr>
             <a:r>
               <a:rPr lang="en-US" dirty="0"/>
-              <a:t>NAT</a:t>
+              <a:t>Protocol analysis</a:t>
             </a:r>
           </a:p>
           <a:p>
@@ -6875,7 +7057,7 @@
             </a:pPr>
             <a:r>
               <a:rPr lang="en-US" dirty="0"/>
-              <a:t>Stateful inspection firewalls</a:t>
+              <a:t>Heuristic-based analysis</a:t>
             </a:r>
           </a:p>
           <a:p>
@@ -6885,7 +7067,17 @@
             </a:pPr>
             <a:r>
               <a:rPr lang="en-US" dirty="0"/>
-              <a:t>Next-gen context-aware firewalls</a:t>
+              <a:t>Anomaly-based analysis</a:t>
+            </a:r>
+          </a:p>
+          <a:p>
+            <a:pPr>
+              <a:buFont typeface="Arial" panose="020B0604020202020204" pitchFamily="34" charset="0"/>
+              <a:buChar char="•"/>
+            </a:pPr>
+            <a:r>
+              <a:rPr lang="en-US" dirty="0"/>
+              <a:t>Correlation protection capabilities based on threat intelligence</a:t>
             </a:r>
           </a:p>
         </p:txBody>
@@ -6893,7 +7085,7 @@
     </p:spTree>
     <p:extLst>
       <p:ext uri="{BB962C8B-B14F-4D97-AF65-F5344CB8AC3E}">
-        <p14:creationId xmlns:p14="http://schemas.microsoft.com/office/powerpoint/2010/main" val="3310384940"/>
+        <p14:creationId xmlns:p14="http://schemas.microsoft.com/office/powerpoint/2010/main" val="2453560799"/>
       </p:ext>
     </p:extLst>
   </p:cSld>
@@ -6925,7 +7117,7 @@
           <p:cNvPr id="2" name="Title 1">
             <a:extLst>
               <a:ext uri="{FF2B5EF4-FFF2-40B4-BE49-F238E27FC236}">
-                <a16:creationId xmlns:a16="http://schemas.microsoft.com/office/drawing/2014/main" id="{3C97B136-A603-4A44-D031-4B88EDC11EAF}"/>
+                <a16:creationId xmlns:a16="http://schemas.microsoft.com/office/drawing/2014/main" id="{A9B31E41-F918-DCD4-4005-65535EB02034}"/>
               </a:ext>
             </a:extLst>
           </p:cNvPr>
@@ -6943,7 +7135,7 @@
           <a:p>
             <a:r>
               <a:rPr lang="en-US" dirty="0"/>
-              <a:t>Intrusion Detection and Prevention</a:t>
+              <a:t>Content filtering &amp; whitelisting/Backlisting</a:t>
             </a:r>
           </a:p>
         </p:txBody>
@@ -6953,7 +7145,7 @@
           <p:cNvPr id="3" name="Content Placeholder 2">
             <a:extLst>
               <a:ext uri="{FF2B5EF4-FFF2-40B4-BE49-F238E27FC236}">
-                <a16:creationId xmlns:a16="http://schemas.microsoft.com/office/drawing/2014/main" id="{D321A911-79A8-3089-B204-4E47D2EE3FB8}"/>
+                <a16:creationId xmlns:a16="http://schemas.microsoft.com/office/drawing/2014/main" id="{ACEDED1F-A35C-1160-5F4E-D4EBA5B5870F}"/>
               </a:ext>
             </a:extLst>
           </p:cNvPr>
@@ -6964,32 +7156,60 @@
             <p:ph idx="1"/>
           </p:nvPr>
         </p:nvSpPr>
-        <p:spPr/>
-        <p:txBody>
-          <a:bodyPr/>
-          <a:lstStyle/>
-          <a:p>
-            <a:r>
-              <a:rPr lang="en-US" dirty="0"/>
-              <a:t>When malicious activities masquerade legitimate traffic these are used</a:t>
-            </a:r>
-          </a:p>
-          <a:p>
-            <a:r>
-              <a:rPr lang="en-US" dirty="0"/>
-              <a:t>IDS is a passive to analyze traffic to detect unauthorized access, and stressful protocol analysis and if it detects anything IDS generates an email, message or text alert.</a:t>
-            </a:r>
-          </a:p>
-          <a:p>
-            <a:endParaRPr lang="en-US" dirty="0"/>
-          </a:p>
+        <p:spPr>
+          <a:xfrm>
+            <a:off x="1097280" y="2038627"/>
+            <a:ext cx="10058400" cy="3760891"/>
+          </a:xfrm>
+        </p:spPr>
+        <p:txBody>
+          <a:bodyPr>
+            <a:normAutofit fontScale="92500" lnSpcReduction="20000"/>
+          </a:bodyPr>
+          <a:lstStyle/>
           <a:p>
             <a:pPr marL="0" indent="0">
               <a:buNone/>
             </a:pPr>
             <a:r>
               <a:rPr lang="en-US" dirty="0"/>
-              <a:t>IPS is an active device which seats in line with traffic and responds to identify threads by disabling connection, dropping packets or deleting malicious content.</a:t>
+              <a:t>To prevent insider requests that could lead to the propagation of malware, data exfiltration, participation in peer-to-peer (P2P) networks, and viewing of inappropriate or unlawful content, controls must be in place. The insider request could be a reaction to a malicious command or directive, or it could originate from authenticated authorized users. As was previously said, outbound traffic can and should be constrained by source and destination addresses, ports, and protocols using border device egress filters. Self-generated, open-source source, or subscription-based IP whitelists and/or blacklists can be used in addition to the filters.</a:t>
+            </a:r>
+          </a:p>
+          <a:p>
+            <a:pPr marL="0" indent="0">
+              <a:buNone/>
+            </a:pPr>
+            <a:r>
+              <a:rPr lang="en-US" dirty="0"/>
+              <a:t>Whitelist: Specific sites have access</a:t>
+            </a:r>
+          </a:p>
+          <a:p>
+            <a:pPr marL="0" indent="0">
+              <a:buNone/>
+            </a:pPr>
+            <a:r>
+              <a:rPr lang="en-US" dirty="0"/>
+              <a:t>Blacklist: Where access is denied</a:t>
+            </a:r>
+          </a:p>
+          <a:p>
+            <a:pPr marL="0" indent="0">
+              <a:buNone/>
+            </a:pPr>
+            <a:r>
+              <a:rPr lang="en-US" dirty="0"/>
+              <a:t>It commonly blocks the entire range of IPS specific to geographic locations</a:t>
+            </a:r>
+          </a:p>
+          <a:p>
+            <a:pPr marL="0" indent="0">
+              <a:buNone/>
+            </a:pPr>
+            <a:r>
+              <a:rPr lang="en-US" dirty="0"/>
+              <a:t>Restrict the access by content categories.</a:t>
             </a:r>
           </a:p>
         </p:txBody>
@@ -6997,7 +7217,7 @@
     </p:spTree>
     <p:extLst>
       <p:ext uri="{BB962C8B-B14F-4D97-AF65-F5344CB8AC3E}">
-        <p14:creationId xmlns:p14="http://schemas.microsoft.com/office/powerpoint/2010/main" val="641647791"/>
+        <p14:creationId xmlns:p14="http://schemas.microsoft.com/office/powerpoint/2010/main" val="4131373296"/>
       </p:ext>
     </p:extLst>
   </p:cSld>
@@ -7029,7 +7249,7 @@
           <p:cNvPr id="2" name="Title 1">
             <a:extLst>
               <a:ext uri="{FF2B5EF4-FFF2-40B4-BE49-F238E27FC236}">
-                <a16:creationId xmlns:a16="http://schemas.microsoft.com/office/drawing/2014/main" id="{83E6490C-B842-544D-F467-2C1996586976}"/>
+                <a16:creationId xmlns:a16="http://schemas.microsoft.com/office/drawing/2014/main" id="{51160772-DA72-FFA8-C69E-34809D0F39A9}"/>
               </a:ext>
             </a:extLst>
           </p:cNvPr>
@@ -7047,7 +7267,7 @@
           <a:p>
             <a:r>
               <a:rPr lang="en-US" dirty="0"/>
-              <a:t>Technologies used by IDS/IPS</a:t>
+              <a:t>Border device administration and management</a:t>
             </a:r>
           </a:p>
         </p:txBody>
@@ -7057,7 +7277,7 @@
           <p:cNvPr id="3" name="Content Placeholder 2">
             <a:extLst>
               <a:ext uri="{FF2B5EF4-FFF2-40B4-BE49-F238E27FC236}">
-                <a16:creationId xmlns:a16="http://schemas.microsoft.com/office/drawing/2014/main" id="{FC39A5D6-6977-8E39-6950-F696BF2696F3}"/>
+                <a16:creationId xmlns:a16="http://schemas.microsoft.com/office/drawing/2014/main" id="{FE096093-054E-F5C1-36EA-5F32C456F3D4}"/>
               </a:ext>
             </a:extLst>
           </p:cNvPr>
@@ -7073,66 +7293,35 @@
           <a:bodyPr/>
           <a:lstStyle/>
           <a:p>
-            <a:pPr marL="457200" indent="-457200">
-              <a:buFont typeface="+mj-lt"/>
-              <a:buAutoNum type="arabicPeriod"/>
-            </a:pPr>
-            <a:r>
-              <a:rPr lang="en-US" dirty="0"/>
-              <a:t>Network-based: Monitors network traffic for a specific segment, and device and analyze activities.</a:t>
-            </a:r>
-          </a:p>
-          <a:p>
-            <a:pPr marL="457200" indent="-457200">
-              <a:buFont typeface="+mj-lt"/>
-              <a:buAutoNum type="arabicPeriod"/>
-            </a:pPr>
-            <a:r>
-              <a:rPr lang="en-US" dirty="0"/>
-              <a:t>Wireless IDS/IPS: Monitors wireless network traffic and analyzes activities and protocols.</a:t>
-            </a:r>
-          </a:p>
-          <a:p>
-            <a:pPr marL="457200" indent="-457200">
-              <a:buFont typeface="+mj-lt"/>
-              <a:buAutoNum type="arabicPeriod"/>
-            </a:pPr>
-            <a:r>
-              <a:rPr lang="en-US" dirty="0"/>
-              <a:t>Network </a:t>
-            </a:r>
-            <a:r>
-              <a:rPr lang="en-US" dirty="0" err="1"/>
-              <a:t>behavioural</a:t>
-            </a:r>
-            <a:r>
-              <a:rPr lang="en-US" dirty="0"/>
-              <a:t> analysis: It examines the traffic to identify threats, information flow, DDOS, malware and policy violations.</a:t>
-            </a:r>
-          </a:p>
-          <a:p>
-            <a:pPr marL="457200" indent="-457200">
-              <a:buFont typeface="+mj-lt"/>
-              <a:buAutoNum type="arabicPeriod"/>
-            </a:pPr>
-            <a:r>
-              <a:rPr lang="en-US" dirty="0"/>
-              <a:t>Host-based IDS/IPS: It monitors every single host and its events.</a:t>
-            </a:r>
-          </a:p>
-          <a:p>
-            <a:pPr marL="457200" indent="-457200">
-              <a:buFont typeface="+mj-lt"/>
-              <a:buAutoNum type="arabicPeriod"/>
-            </a:pPr>
-            <a:endParaRPr lang="en-US" dirty="0"/>
+            <a:r>
+              <a:rPr lang="en-US" dirty="0"/>
+              <a:t>Everything has to be monitored- Logs and alerts must be monitored and analyzed (successful and unsuccessful both)</a:t>
+            </a:r>
+          </a:p>
+          <a:p>
+            <a:r>
+              <a:rPr lang="en-US" dirty="0"/>
+              <a:t>Policies need to be updated as per requirements </a:t>
+            </a:r>
+          </a:p>
+          <a:p>
+            <a:r>
+              <a:rPr lang="en-US" dirty="0"/>
+              <a:t>Detail examination of all changes since the last review</a:t>
+            </a:r>
+          </a:p>
+          <a:p>
+            <a:r>
+              <a:rPr lang="en-US" dirty="0"/>
+              <a:t>External pen testing used to verify the device performance</a:t>
+            </a:r>
           </a:p>
         </p:txBody>
       </p:sp>
     </p:spTree>
     <p:extLst>
       <p:ext uri="{BB962C8B-B14F-4D97-AF65-F5344CB8AC3E}">
-        <p14:creationId xmlns:p14="http://schemas.microsoft.com/office/powerpoint/2010/main" val="211107562"/>
+        <p14:creationId xmlns:p14="http://schemas.microsoft.com/office/powerpoint/2010/main" val="2079736115"/>
       </p:ext>
     </p:extLst>
   </p:cSld>
@@ -7164,7 +7353,7 @@
           <p:cNvPr id="2" name="Title 1">
             <a:extLst>
               <a:ext uri="{FF2B5EF4-FFF2-40B4-BE49-F238E27FC236}">
-                <a16:creationId xmlns:a16="http://schemas.microsoft.com/office/drawing/2014/main" id="{528D3DEA-CE54-A793-9FEA-A36FA50D63D5}"/>
+                <a16:creationId xmlns:a16="http://schemas.microsoft.com/office/drawing/2014/main" id="{F18155DF-46EB-4C54-1F1E-924EE45BED40}"/>
               </a:ext>
             </a:extLst>
           </p:cNvPr>
@@ -7180,7 +7369,10 @@
           <a:bodyPr/>
           <a:lstStyle/>
           <a:p>
-            <a:endParaRPr lang="en-US" dirty="0"/>
+            <a:r>
+              <a:rPr lang="en-US" dirty="0"/>
+              <a:t>Types of Security groups</a:t>
+            </a:r>
           </a:p>
         </p:txBody>
       </p:sp>
@@ -7189,7 +7381,7 @@
           <p:cNvPr id="3" name="Content Placeholder 2">
             <a:extLst>
               <a:ext uri="{FF2B5EF4-FFF2-40B4-BE49-F238E27FC236}">
-                <a16:creationId xmlns:a16="http://schemas.microsoft.com/office/drawing/2014/main" id="{13B76399-18A5-36FB-2373-DB31B8662B7C}"/>
+                <a16:creationId xmlns:a16="http://schemas.microsoft.com/office/drawing/2014/main" id="{3EBC44D5-3F50-0DD5-51E5-36A81C2C44B8}"/>
               </a:ext>
             </a:extLst>
           </p:cNvPr>
@@ -7207,47 +7399,19 @@
           <a:p>
             <a:r>
               <a:rPr lang="en-US" dirty="0"/>
-              <a:t>From these technologies, it has 4 decision states –</a:t>
-            </a:r>
-          </a:p>
-          <a:p>
-            <a:pPr marL="457200" indent="-457200">
-              <a:buFont typeface="+mj-lt"/>
-              <a:buAutoNum type="arabicPeriod"/>
-            </a:pPr>
-            <a:r>
-              <a:rPr lang="en-US" dirty="0"/>
-              <a:t>True positive:  It correctly identifies an issue.</a:t>
-            </a:r>
-          </a:p>
-          <a:p>
-            <a:pPr marL="457200" indent="-457200">
-              <a:buFont typeface="+mj-lt"/>
-              <a:buAutoNum type="arabicPeriod"/>
-            </a:pPr>
-            <a:r>
-              <a:rPr lang="en-US" dirty="0"/>
-              <a:t>True Negative: It correctly identifies normal traffic.</a:t>
-            </a:r>
-          </a:p>
-          <a:p>
-            <a:pPr marL="457200" indent="-457200">
-              <a:buFont typeface="+mj-lt"/>
-              <a:buAutoNum type="arabicPeriod"/>
-            </a:pPr>
-            <a:r>
-              <a:rPr lang="en-US" dirty="0"/>
-              <a:t>False Positive: Incorrectly identifies normal activity as an issue</a:t>
-            </a:r>
-          </a:p>
-          <a:p>
-            <a:pPr marL="457200" indent="-457200">
-              <a:buFont typeface="+mj-lt"/>
-              <a:buAutoNum type="arabicPeriod"/>
-            </a:pPr>
-            <a:r>
-              <a:rPr lang="en-US" dirty="0"/>
-              <a:t>False Negative: Incorrectly identifies an issue as normal activity.</a:t>
+              <a:t>Blue teams: Defenders of the corporate network which includes SOC, CSIRTS, Infosec teams</a:t>
+            </a:r>
+          </a:p>
+          <a:p>
+            <a:r>
+              <a:rPr lang="en-US" dirty="0"/>
+              <a:t>Red Teams: Ethical hackers, Pen testers who identify vulnerabilities, attack detection and response capability of the device.</a:t>
+            </a:r>
+          </a:p>
+          <a:p>
+            <a:r>
+              <a:rPr lang="en-US" dirty="0"/>
+              <a:t>Purple Team: When Red and Blue teams aligned forces to completely defend the organization.</a:t>
             </a:r>
           </a:p>
         </p:txBody>
@@ -7255,7 +7419,7 @@
     </p:spTree>
     <p:extLst>
       <p:ext uri="{BB962C8B-B14F-4D97-AF65-F5344CB8AC3E}">
-        <p14:creationId xmlns:p14="http://schemas.microsoft.com/office/powerpoint/2010/main" val="2688818695"/>
+        <p14:creationId xmlns:p14="http://schemas.microsoft.com/office/powerpoint/2010/main" val="3831653995"/>
       </p:ext>
     </p:extLst>
   </p:cSld>
@@ -7424,7 +7588,7 @@
           <p:cNvPr id="2" name="Title 1">
             <a:extLst>
               <a:ext uri="{FF2B5EF4-FFF2-40B4-BE49-F238E27FC236}">
-                <a16:creationId xmlns:a16="http://schemas.microsoft.com/office/drawing/2014/main" id="{F646DBC6-A618-85D6-A6DE-A4F22A157E52}"/>
+                <a16:creationId xmlns:a16="http://schemas.microsoft.com/office/drawing/2014/main" id="{A2223E51-B824-7790-91D2-F4E35D898D1E}"/>
               </a:ext>
             </a:extLst>
           </p:cNvPr>
@@ -7442,7 +7606,7 @@
           <a:p>
             <a:r>
               <a:rPr lang="en-US" dirty="0"/>
-              <a:t>Network-Based IDS/IPS uses these detection methodologies</a:t>
+              <a:t>Remote access security</a:t>
             </a:r>
           </a:p>
         </p:txBody>
@@ -7452,7 +7616,7 @@
           <p:cNvPr id="3" name="Content Placeholder 2">
             <a:extLst>
               <a:ext uri="{FF2B5EF4-FFF2-40B4-BE49-F238E27FC236}">
-                <a16:creationId xmlns:a16="http://schemas.microsoft.com/office/drawing/2014/main" id="{B156CA4E-E1F2-C33F-7F5B-DF71D9E85F7F}"/>
+                <a16:creationId xmlns:a16="http://schemas.microsoft.com/office/drawing/2014/main" id="{2AC473FA-6F9F-106A-611D-23814E22C957}"/>
               </a:ext>
             </a:extLst>
           </p:cNvPr>
@@ -7468,61 +7632,47 @@
           <a:bodyPr/>
           <a:lstStyle/>
           <a:p>
-            <a:pPr>
-              <a:buFont typeface="Arial" panose="020B0604020202020204" pitchFamily="34" charset="0"/>
-              <a:buChar char="•"/>
+            <a:r>
+              <a:rPr lang="en-US" dirty="0"/>
+              <a:t>It is getting common increasingly that it has become normal now</a:t>
+            </a:r>
+          </a:p>
+          <a:p>
+            <a:r>
+              <a:rPr lang="en-US" dirty="0"/>
+              <a:t>It has controls like authentication that must be chosen carefully based on network-segmented information and classification that is accessible.</a:t>
+            </a:r>
+          </a:p>
+          <a:p>
+            <a:pPr marL="0" indent="0">
+              <a:buNone/>
             </a:pPr>
             <a:r>
               <a:rPr lang="en-US" dirty="0"/>
-              <a:t>Pattern matching and stateful pattern matching recognition</a:t>
-            </a:r>
-          </a:p>
-          <a:p>
-            <a:pPr>
-              <a:buFont typeface="Arial" panose="020B0604020202020204" pitchFamily="34" charset="0"/>
-              <a:buChar char="•"/>
-            </a:pPr>
-            <a:r>
-              <a:rPr lang="en-US" dirty="0"/>
-              <a:t>Protocol analysis</a:t>
-            </a:r>
-          </a:p>
-          <a:p>
-            <a:pPr>
-              <a:buFont typeface="Arial" panose="020B0604020202020204" pitchFamily="34" charset="0"/>
-              <a:buChar char="•"/>
-            </a:pPr>
-            <a:r>
-              <a:rPr lang="en-US" dirty="0"/>
-              <a:t>Heuristic-based analysis</a:t>
-            </a:r>
-          </a:p>
-          <a:p>
-            <a:pPr>
-              <a:buFont typeface="Arial" panose="020B0604020202020204" pitchFamily="34" charset="0"/>
-              <a:buChar char="•"/>
-            </a:pPr>
-            <a:r>
-              <a:rPr lang="en-US" dirty="0"/>
-              <a:t>Anomaly-based analysis</a:t>
-            </a:r>
-          </a:p>
-          <a:p>
-            <a:pPr>
-              <a:buFont typeface="Arial" panose="020B0604020202020204" pitchFamily="34" charset="0"/>
-              <a:buChar char="•"/>
-            </a:pPr>
-            <a:r>
-              <a:rPr lang="en-US" dirty="0"/>
-              <a:t>Correlation protection capabilities based on threat intelligence</a:t>
-            </a:r>
+              <a:t>It follows CIA triads</a:t>
+            </a:r>
+          </a:p>
+          <a:p>
+            <a:r>
+              <a:rPr lang="en-US" dirty="0"/>
+              <a:t>Restricted information can’t be accessible to unauthorized parties, detecting good and bad modifications and ensuring the user can access required resources</a:t>
+            </a:r>
+          </a:p>
+          <a:p>
+            <a:r>
+              <a:rPr lang="en-US" dirty="0"/>
+              <a:t>It must include physical control of client devices.</a:t>
+            </a:r>
+          </a:p>
+          <a:p>
+            <a:endParaRPr lang="en-US" dirty="0"/>
           </a:p>
         </p:txBody>
       </p:sp>
     </p:spTree>
     <p:extLst>
       <p:ext uri="{BB962C8B-B14F-4D97-AF65-F5344CB8AC3E}">
-        <p14:creationId xmlns:p14="http://schemas.microsoft.com/office/powerpoint/2010/main" val="2453560799"/>
+        <p14:creationId xmlns:p14="http://schemas.microsoft.com/office/powerpoint/2010/main" val="3778690245"/>
       </p:ext>
     </p:extLst>
   </p:cSld>
@@ -7554,7 +7704,7 @@
           <p:cNvPr id="2" name="Title 1">
             <a:extLst>
               <a:ext uri="{FF2B5EF4-FFF2-40B4-BE49-F238E27FC236}">
-                <a16:creationId xmlns:a16="http://schemas.microsoft.com/office/drawing/2014/main" id="{A9B31E41-F918-DCD4-4005-65535EB02034}"/>
+                <a16:creationId xmlns:a16="http://schemas.microsoft.com/office/drawing/2014/main" id="{7F15F437-059F-15BB-8DEE-4317F58D0763}"/>
               </a:ext>
             </a:extLst>
           </p:cNvPr>
@@ -7572,7 +7722,7 @@
           <a:p>
             <a:r>
               <a:rPr lang="en-US" dirty="0"/>
-              <a:t>Content filtering &amp; whitelisting/Backlisting</a:t>
+              <a:t>Remote access technologies</a:t>
             </a:r>
           </a:p>
         </p:txBody>
@@ -7582,7 +7732,7 @@
           <p:cNvPr id="3" name="Content Placeholder 2">
             <a:extLst>
               <a:ext uri="{FF2B5EF4-FFF2-40B4-BE49-F238E27FC236}">
-                <a16:creationId xmlns:a16="http://schemas.microsoft.com/office/drawing/2014/main" id="{ACEDED1F-A35C-1160-5F4E-D4EBA5B5870F}"/>
+                <a16:creationId xmlns:a16="http://schemas.microsoft.com/office/drawing/2014/main" id="{BA70DCD4-E5AE-1BDE-691F-E11A5E89A49E}"/>
               </a:ext>
             </a:extLst>
           </p:cNvPr>
@@ -7595,53 +7745,18 @@
         </p:nvSpPr>
         <p:spPr/>
         <p:txBody>
-          <a:bodyPr>
-            <a:normAutofit fontScale="92500" lnSpcReduction="20000"/>
-          </a:bodyPr>
-          <a:lstStyle/>
-          <a:p>
-            <a:pPr marL="0" indent="0">
-              <a:buNone/>
-            </a:pPr>
-            <a:r>
-              <a:rPr lang="en-US" dirty="0"/>
-              <a:t>To prevent insider requests that could lead to the propagation of malware, data exfiltration, participation in peer-to-peer (P2P) networks, and viewing of inappropriate or unlawful content, controls must be in place. The insider request could be a reaction to a malicious command or directive or it could originate from authenticated authorized users. As was previously said, outbound traffic can and should be constrained by source and destination addresses, ports, and protocols using border device egress filters. Self-generated, open-source source, or subscription-based IP whitelists and/or blacklists can be used in addition to the filters.</a:t>
-            </a:r>
-          </a:p>
-          <a:p>
-            <a:pPr marL="0" indent="0">
-              <a:buNone/>
-            </a:pPr>
-            <a:r>
-              <a:rPr lang="en-US" dirty="0"/>
-              <a:t>Whitelist: Sites where access is allowed </a:t>
-            </a:r>
-          </a:p>
-          <a:p>
-            <a:pPr marL="0" indent="0">
-              <a:buNone/>
-            </a:pPr>
-            <a:r>
-              <a:rPr lang="en-US" dirty="0"/>
-              <a:t>Blacklist: Where access is denied</a:t>
-            </a:r>
-          </a:p>
-          <a:p>
-            <a:pPr marL="0" indent="0">
-              <a:buNone/>
-            </a:pPr>
-            <a:r>
-              <a:rPr lang="en-US" dirty="0"/>
-              <a:t>It commonly blocks the entire range of IPS specific to geographic locations</a:t>
-            </a:r>
-          </a:p>
-          <a:p>
-            <a:pPr marL="0" indent="0">
-              <a:buNone/>
-            </a:pPr>
-            <a:r>
-              <a:rPr lang="en-US" dirty="0"/>
-              <a:t>Restrict the access by content categories.</a:t>
+          <a:bodyPr/>
+          <a:lstStyle/>
+          <a:p>
+            <a:r>
+              <a:rPr lang="en-US" dirty="0"/>
+              <a:t>VPN: Secure tunnel for transmitting data through the internet.</a:t>
+            </a:r>
+          </a:p>
+          <a:p>
+            <a:r>
+              <a:rPr lang="en-US" dirty="0"/>
+              <a:t>Achieved through tunnelling and encryption. To provide high security without the high cost of private lines. It is connected between physical or remote sites.</a:t>
             </a:r>
           </a:p>
         </p:txBody>
@@ -7649,7 +7764,7 @@
     </p:spTree>
     <p:extLst>
       <p:ext uri="{BB962C8B-B14F-4D97-AF65-F5344CB8AC3E}">
-        <p14:creationId xmlns:p14="http://schemas.microsoft.com/office/powerpoint/2010/main" val="4131373296"/>
+        <p14:creationId xmlns:p14="http://schemas.microsoft.com/office/powerpoint/2010/main" val="2092552656"/>
       </p:ext>
     </p:extLst>
   </p:cSld>
@@ -7681,7 +7796,7 @@
           <p:cNvPr id="2" name="Title 1">
             <a:extLst>
               <a:ext uri="{FF2B5EF4-FFF2-40B4-BE49-F238E27FC236}">
-                <a16:creationId xmlns:a16="http://schemas.microsoft.com/office/drawing/2014/main" id="{51160772-DA72-FFA8-C69E-34809D0F39A9}"/>
+                <a16:creationId xmlns:a16="http://schemas.microsoft.com/office/drawing/2014/main" id="{85B20180-788D-FE2D-AD4D-83B45DDAC50D}"/>
               </a:ext>
             </a:extLst>
           </p:cNvPr>
@@ -7699,7 +7814,7 @@
           <a:p>
             <a:r>
               <a:rPr lang="en-US" dirty="0"/>
-              <a:t>Border device administration and management</a:t>
+              <a:t>Remote access authentication and authorization</a:t>
             </a:r>
           </a:p>
         </p:txBody>
@@ -7709,7 +7824,7 @@
           <p:cNvPr id="3" name="Content Placeholder 2">
             <a:extLst>
               <a:ext uri="{FF2B5EF4-FFF2-40B4-BE49-F238E27FC236}">
-                <a16:creationId xmlns:a16="http://schemas.microsoft.com/office/drawing/2014/main" id="{FE096093-054E-F5C1-36EA-5F32C456F3D4}"/>
+                <a16:creationId xmlns:a16="http://schemas.microsoft.com/office/drawing/2014/main" id="{5BE3F581-B99F-8BC9-CACE-3D51DA2BA496}"/>
               </a:ext>
             </a:extLst>
           </p:cNvPr>
@@ -7727,25 +7842,19 @@
           <a:p>
             <a:r>
               <a:rPr lang="en-US" dirty="0"/>
-              <a:t>Everything has to be monitored- Logs and alerts must be monitored and analyzed (successful and unsuccessful both)</a:t>
-            </a:r>
-          </a:p>
-          <a:p>
-            <a:r>
-              <a:rPr lang="en-US" dirty="0"/>
-              <a:t>Policies need to be updated as per requirements </a:t>
-            </a:r>
-          </a:p>
-          <a:p>
-            <a:r>
-              <a:rPr lang="en-US" dirty="0"/>
-              <a:t>Detail examination of all changes since the last review</a:t>
-            </a:r>
-          </a:p>
-          <a:p>
-            <a:r>
-              <a:rPr lang="en-US" dirty="0"/>
-              <a:t>External pen testing used to verify the device performance</a:t>
+              <a:t>Implement mutual authentication so they can verify legitimacy before providing authentication credentials.</a:t>
+            </a:r>
+          </a:p>
+          <a:p>
+            <a:r>
+              <a:rPr lang="en-US" dirty="0"/>
+              <a:t>MFA is required for access</a:t>
+            </a:r>
+          </a:p>
+          <a:p>
+            <a:r>
+              <a:rPr lang="en-US" dirty="0"/>
+              <a:t>Additionally user should require authentication periodically in remote access devices, they should ensure if they made the base line required for internal systems.</a:t>
             </a:r>
           </a:p>
         </p:txBody>
@@ -7753,7 +7862,7 @@
     </p:spTree>
     <p:extLst>
       <p:ext uri="{BB962C8B-B14F-4D97-AF65-F5344CB8AC3E}">
-        <p14:creationId xmlns:p14="http://schemas.microsoft.com/office/powerpoint/2010/main" val="2079736115"/>
+        <p14:creationId xmlns:p14="http://schemas.microsoft.com/office/powerpoint/2010/main" val="1309017816"/>
       </p:ext>
     </p:extLst>
   </p:cSld>
@@ -7785,7 +7894,7 @@
           <p:cNvPr id="2" name="Title 1">
             <a:extLst>
               <a:ext uri="{FF2B5EF4-FFF2-40B4-BE49-F238E27FC236}">
-                <a16:creationId xmlns:a16="http://schemas.microsoft.com/office/drawing/2014/main" id="{F18155DF-46EB-4C54-1F1E-924EE45BED40}"/>
+                <a16:creationId xmlns:a16="http://schemas.microsoft.com/office/drawing/2014/main" id="{ED41F894-60A1-5384-512E-23F93C35274F}"/>
               </a:ext>
             </a:extLst>
           </p:cNvPr>
@@ -7803,7 +7912,7 @@
           <a:p>
             <a:r>
               <a:rPr lang="en-US" dirty="0"/>
-              <a:t>	</a:t>
+              <a:t>Network access control</a:t>
             </a:r>
           </a:p>
         </p:txBody>
@@ -7813,7 +7922,7 @@
           <p:cNvPr id="3" name="Content Placeholder 2">
             <a:extLst>
               <a:ext uri="{FF2B5EF4-FFF2-40B4-BE49-F238E27FC236}">
-                <a16:creationId xmlns:a16="http://schemas.microsoft.com/office/drawing/2014/main" id="{3EBC44D5-3F50-0DD5-51E5-36A81C2C44B8}"/>
+                <a16:creationId xmlns:a16="http://schemas.microsoft.com/office/drawing/2014/main" id="{690C7F1B-6CD7-D6B1-C402-1BCC1866FF1D}"/>
               </a:ext>
             </a:extLst>
           </p:cNvPr>
@@ -7831,19 +7940,7 @@
           <a:p>
             <a:r>
               <a:rPr lang="en-US" dirty="0"/>
-              <a:t>Blue teams: Defenders of the corporate network which includes SOC, CSIRTS, Infosec teams</a:t>
-            </a:r>
-          </a:p>
-          <a:p>
-            <a:r>
-              <a:rPr lang="en-US" dirty="0"/>
-              <a:t>Red Teams: Ethical hackers, Pen testers who identify vulnerabilities, attack detection and response capability of the device.</a:t>
-            </a:r>
-          </a:p>
-          <a:p>
-            <a:r>
-              <a:rPr lang="en-US" dirty="0"/>
-              <a:t>Purple Team: When Red and Blue teams aligned forces to completely defend the organization.</a:t>
+              <a:t>Used to check remote access device based on its criteria, if it doesn’t meet a specific criteria access is denied.</a:t>
             </a:r>
           </a:p>
         </p:txBody>
@@ -7851,7 +7948,7 @@
     </p:spTree>
     <p:extLst>
       <p:ext uri="{BB962C8B-B14F-4D97-AF65-F5344CB8AC3E}">
-        <p14:creationId xmlns:p14="http://schemas.microsoft.com/office/powerpoint/2010/main" val="3831653995"/>
+        <p14:creationId xmlns:p14="http://schemas.microsoft.com/office/powerpoint/2010/main" val="935807662"/>
       </p:ext>
     </p:extLst>
   </p:cSld>
@@ -7883,7 +7980,7 @@
           <p:cNvPr id="2" name="Title 1">
             <a:extLst>
               <a:ext uri="{FF2B5EF4-FFF2-40B4-BE49-F238E27FC236}">
-                <a16:creationId xmlns:a16="http://schemas.microsoft.com/office/drawing/2014/main" id="{A2223E51-B824-7790-91D2-F4E35D898D1E}"/>
+                <a16:creationId xmlns:a16="http://schemas.microsoft.com/office/drawing/2014/main" id="{EB8AD0FA-DD8C-8E54-699B-D9F113E7DFDB}"/>
               </a:ext>
             </a:extLst>
           </p:cNvPr>
@@ -7901,7 +7998,7 @@
           <a:p>
             <a:r>
               <a:rPr lang="en-US" dirty="0"/>
-              <a:t>Remote access security</a:t>
+              <a:t>Teleworking access control</a:t>
             </a:r>
           </a:p>
         </p:txBody>
@@ -7911,7 +8008,7 @@
           <p:cNvPr id="3" name="Content Placeholder 2">
             <a:extLst>
               <a:ext uri="{FF2B5EF4-FFF2-40B4-BE49-F238E27FC236}">
-                <a16:creationId xmlns:a16="http://schemas.microsoft.com/office/drawing/2014/main" id="{2AC473FA-6F9F-106A-611D-23814E22C957}"/>
+                <a16:creationId xmlns:a16="http://schemas.microsoft.com/office/drawing/2014/main" id="{A434293C-74E3-27F7-7CFD-2B736111486C}"/>
               </a:ext>
             </a:extLst>
           </p:cNvPr>
@@ -7929,34 +8026,7 @@
           <a:p>
             <a:r>
               <a:rPr lang="en-US" dirty="0"/>
-              <a:t>It is getting common increasingly that it has become normal now</a:t>
-            </a:r>
-          </a:p>
-          <a:p>
-            <a:r>
-              <a:rPr lang="en-US" dirty="0"/>
-              <a:t>It has controls like authentication that must be chosen carefully based on network-segmented information and classification that is accessible.</a:t>
-            </a:r>
-          </a:p>
-          <a:p>
-            <a:pPr marL="0" indent="0">
-              <a:buNone/>
-            </a:pPr>
-            <a:r>
-              <a:rPr lang="en-US" dirty="0"/>
-              <a:t>It follows CIA triads</a:t>
-            </a:r>
-          </a:p>
-          <a:p>
-            <a:r>
-              <a:rPr lang="en-US" dirty="0"/>
-              <a:t>Restricted information can’t be accessible to unauthorized parties, detecting good and bad modifications and ensuring the user can access required resources</a:t>
-            </a:r>
-          </a:p>
-          <a:p>
-            <a:r>
-              <a:rPr lang="en-US" dirty="0"/>
-              <a:t>It must include physical control of client devices.</a:t>
+              <a:t>Work flexibility arrangement under which employee performs his duties and responsibilities such as positions and other authorized activities from work site to location to work.</a:t>
             </a:r>
           </a:p>
           <a:p>
@@ -7967,7 +8037,7 @@
     </p:spTree>
     <p:extLst>
       <p:ext uri="{BB962C8B-B14F-4D97-AF65-F5344CB8AC3E}">
-        <p14:creationId xmlns:p14="http://schemas.microsoft.com/office/powerpoint/2010/main" val="3778690245"/>
+        <p14:creationId xmlns:p14="http://schemas.microsoft.com/office/powerpoint/2010/main" val="2106614610"/>
       </p:ext>
     </p:extLst>
   </p:cSld>
@@ -7999,7 +8069,7 @@
           <p:cNvPr id="2" name="Title 1">
             <a:extLst>
               <a:ext uri="{FF2B5EF4-FFF2-40B4-BE49-F238E27FC236}">
-                <a16:creationId xmlns:a16="http://schemas.microsoft.com/office/drawing/2014/main" id="{7F15F437-059F-15BB-8DEE-4317F58D0763}"/>
+                <a16:creationId xmlns:a16="http://schemas.microsoft.com/office/drawing/2014/main" id="{5E896FC0-401B-A606-3B18-39834C0AC108}"/>
               </a:ext>
             </a:extLst>
           </p:cNvPr>
@@ -8017,7 +8087,7 @@
           <a:p>
             <a:r>
               <a:rPr lang="en-US" dirty="0"/>
-              <a:t>Remote access technologies</a:t>
+              <a:t>Benefits</a:t>
             </a:r>
           </a:p>
         </p:txBody>
@@ -8027,7 +8097,7 @@
           <p:cNvPr id="3" name="Content Placeholder 2">
             <a:extLst>
               <a:ext uri="{FF2B5EF4-FFF2-40B4-BE49-F238E27FC236}">
-                <a16:creationId xmlns:a16="http://schemas.microsoft.com/office/drawing/2014/main" id="{BA70DCD4-E5AE-1BDE-691F-E11A5E89A49E}"/>
+                <a16:creationId xmlns:a16="http://schemas.microsoft.com/office/drawing/2014/main" id="{56AD5E21-B889-6346-9EEE-147EC3A16C29}"/>
               </a:ext>
             </a:extLst>
           </p:cNvPr>
@@ -8045,13 +8115,37 @@
           <a:p>
             <a:r>
               <a:rPr lang="en-US" dirty="0"/>
-              <a:t>VPN: Secure tunnel for transmitting data through the internet.</a:t>
-            </a:r>
-          </a:p>
-          <a:p>
-            <a:r>
-              <a:rPr lang="en-US" dirty="0"/>
-              <a:t>Achieved through tunnelling and encryption. To provide high security without the high cost of private lines. It is connected between physical or remote sites.</a:t>
+              <a:t>Increased motivation and productivity</a:t>
+            </a:r>
+          </a:p>
+          <a:p>
+            <a:r>
+              <a:rPr lang="en-US" dirty="0"/>
+              <a:t>Reduction in vehicle pollution </a:t>
+            </a:r>
+          </a:p>
+          <a:p>
+            <a:r>
+              <a:rPr lang="en-US" dirty="0"/>
+              <a:t>Improved work-life balance</a:t>
+            </a:r>
+          </a:p>
+          <a:p>
+            <a:r>
+              <a:rPr lang="en-US" dirty="0"/>
+              <a:t>Reduced dependency on imported oils</a:t>
+            </a:r>
+          </a:p>
+          <a:p>
+            <a:r>
+              <a:rPr lang="en-US" dirty="0"/>
+              <a:t>New opportunities </a:t>
+            </a:r>
+          </a:p>
+          <a:p>
+            <a:r>
+              <a:rPr lang="en-US" dirty="0"/>
+              <a:t>Establishment of distributed workflows</a:t>
             </a:r>
           </a:p>
         </p:txBody>
@@ -8059,7 +8153,7 @@
     </p:spTree>
     <p:extLst>
       <p:ext uri="{BB962C8B-B14F-4D97-AF65-F5344CB8AC3E}">
-        <p14:creationId xmlns:p14="http://schemas.microsoft.com/office/powerpoint/2010/main" val="2092552656"/>
+        <p14:creationId xmlns:p14="http://schemas.microsoft.com/office/powerpoint/2010/main" val="676721497"/>
       </p:ext>
     </p:extLst>
   </p:cSld>
@@ -8091,7 +8185,7 @@
           <p:cNvPr id="2" name="Title 1">
             <a:extLst>
               <a:ext uri="{FF2B5EF4-FFF2-40B4-BE49-F238E27FC236}">
-                <a16:creationId xmlns:a16="http://schemas.microsoft.com/office/drawing/2014/main" id="{DCCC8674-22AB-9BBB-1DD6-845BA2DAB276}"/>
+                <a16:creationId xmlns:a16="http://schemas.microsoft.com/office/drawing/2014/main" id="{D0C9275D-5BB1-407F-37C4-B4C1172B867A}"/>
               </a:ext>
             </a:extLst>
           </p:cNvPr>
@@ -8107,7 +8201,10 @@
           <a:bodyPr/>
           <a:lstStyle/>
           <a:p>
-            <a:endParaRPr lang="en-US" dirty="0"/>
+            <a:r>
+              <a:rPr lang="en-US" dirty="0"/>
+              <a:t>User Access Control</a:t>
+            </a:r>
           </a:p>
         </p:txBody>
       </p:sp>
@@ -8116,7 +8213,7 @@
           <p:cNvPr id="3" name="Content Placeholder 2">
             <a:extLst>
               <a:ext uri="{FF2B5EF4-FFF2-40B4-BE49-F238E27FC236}">
-                <a16:creationId xmlns:a16="http://schemas.microsoft.com/office/drawing/2014/main" id="{5F503FF7-E993-BAEE-8264-850A29B00296}"/>
+                <a16:creationId xmlns:a16="http://schemas.microsoft.com/office/drawing/2014/main" id="{69EF6C75-3779-E6A1-8102-E0B049CF3E47}"/>
               </a:ext>
             </a:extLst>
           </p:cNvPr>
@@ -8132,9 +8229,93 @@
           <a:bodyPr/>
           <a:lstStyle/>
           <a:p>
-            <a:r>
-              <a:rPr lang="en-US" dirty="0"/>
-              <a:t>Single centralized interface which sends data to clients’ device, it is stored temporarily  which limits access</a:t>
+            <a:pPr>
+              <a:buFont typeface="Arial" panose="020B0604020202020204" pitchFamily="34" charset="0"/>
+              <a:buChar char="•"/>
+            </a:pPr>
+            <a:r>
+              <a:rPr lang="en-US" dirty="0"/>
+              <a:t> Our business can’t run without users</a:t>
+            </a:r>
+          </a:p>
+          <a:p>
+            <a:pPr lvl="1">
+              <a:buFont typeface="Arial" panose="020B0604020202020204" pitchFamily="34" charset="0"/>
+              <a:buChar char="•"/>
+            </a:pPr>
+            <a:r>
+              <a:rPr lang="en-US" dirty="0"/>
+              <a:t>Clients or Customers</a:t>
+            </a:r>
+          </a:p>
+          <a:p>
+            <a:pPr lvl="1">
+              <a:buFont typeface="Arial" panose="020B0604020202020204" pitchFamily="34" charset="0"/>
+              <a:buChar char="•"/>
+            </a:pPr>
+            <a:r>
+              <a:rPr lang="en-US" dirty="0"/>
+              <a:t>Employees</a:t>
+            </a:r>
+          </a:p>
+          <a:p>
+            <a:pPr lvl="2">
+              <a:buFont typeface="Arial" panose="020B0604020202020204" pitchFamily="34" charset="0"/>
+              <a:buChar char="•"/>
+            </a:pPr>
+            <a:r>
+              <a:rPr lang="en-US" dirty="0"/>
+              <a:t>HR</a:t>
+            </a:r>
+          </a:p>
+          <a:p>
+            <a:pPr lvl="2">
+              <a:buFont typeface="Arial" panose="020B0604020202020204" pitchFamily="34" charset="0"/>
+              <a:buChar char="•"/>
+            </a:pPr>
+            <a:r>
+              <a:rPr lang="en-US" dirty="0"/>
+              <a:t>IT</a:t>
+            </a:r>
+          </a:p>
+          <a:p>
+            <a:pPr lvl="2">
+              <a:buFont typeface="Arial" panose="020B0604020202020204" pitchFamily="34" charset="0"/>
+              <a:buChar char="•"/>
+            </a:pPr>
+            <a:r>
+              <a:rPr lang="en-US" dirty="0"/>
+              <a:t>Marketing</a:t>
+            </a:r>
+          </a:p>
+          <a:p>
+            <a:pPr lvl="2">
+              <a:buFont typeface="Arial" panose="020B0604020202020204" pitchFamily="34" charset="0"/>
+              <a:buChar char="•"/>
+            </a:pPr>
+            <a:r>
+              <a:rPr lang="en-US" dirty="0"/>
+              <a:t>Managers</a:t>
+            </a:r>
+          </a:p>
+          <a:p>
+            <a:pPr lvl="1">
+              <a:buFont typeface="Arial" panose="020B0604020202020204" pitchFamily="34" charset="0"/>
+              <a:buChar char="•"/>
+            </a:pPr>
+            <a:r>
+              <a:rPr lang="en-US" dirty="0"/>
+              <a:t>Owners</a:t>
+            </a:r>
+          </a:p>
+          <a:p>
+            <a:pPr lvl="1">
+              <a:buFont typeface="Arial" panose="020B0604020202020204" pitchFamily="34" charset="0"/>
+              <a:buChar char="•"/>
+            </a:pPr>
+            <a:r>
+              <a:rPr lang="en-US" dirty="0"/>
+              <a:t>Board Members</a:t>
             </a:r>
           </a:p>
         </p:txBody>
@@ -8142,7 +8323,7 @@
     </p:spTree>
     <p:extLst>
       <p:ext uri="{BB962C8B-B14F-4D97-AF65-F5344CB8AC3E}">
-        <p14:creationId xmlns:p14="http://schemas.microsoft.com/office/powerpoint/2010/main" val="3471563017"/>
+        <p14:creationId xmlns:p14="http://schemas.microsoft.com/office/powerpoint/2010/main" val="923027413"/>
       </p:ext>
     </p:extLst>
   </p:cSld>
@@ -8174,7 +8355,7 @@
           <p:cNvPr id="2" name="Title 1">
             <a:extLst>
               <a:ext uri="{FF2B5EF4-FFF2-40B4-BE49-F238E27FC236}">
-                <a16:creationId xmlns:a16="http://schemas.microsoft.com/office/drawing/2014/main" id="{85B20180-788D-FE2D-AD4D-83B45DDAC50D}"/>
+                <a16:creationId xmlns:a16="http://schemas.microsoft.com/office/drawing/2014/main" id="{DBB1DF90-5AAC-3EC1-5D16-A95BF1B17A71}"/>
               </a:ext>
             </a:extLst>
           </p:cNvPr>
@@ -8192,7 +8373,7 @@
           <a:p>
             <a:r>
               <a:rPr lang="en-US" dirty="0"/>
-              <a:t>Remote access authentication and authorization</a:t>
+              <a:t>What is User Access Control?</a:t>
             </a:r>
           </a:p>
         </p:txBody>
@@ -8202,7 +8383,7 @@
           <p:cNvPr id="3" name="Content Placeholder 2">
             <a:extLst>
               <a:ext uri="{FF2B5EF4-FFF2-40B4-BE49-F238E27FC236}">
-                <a16:creationId xmlns:a16="http://schemas.microsoft.com/office/drawing/2014/main" id="{5BE3F581-B99F-8BC9-CACE-3D51DA2BA496}"/>
+                <a16:creationId xmlns:a16="http://schemas.microsoft.com/office/drawing/2014/main" id="{5DDF6F59-E9DD-C040-D1F0-E81D52F492A2}"/>
               </a:ext>
             </a:extLst>
           </p:cNvPr>
@@ -8220,27 +8401,78 @@
           <a:p>
             <a:r>
               <a:rPr lang="en-US" dirty="0"/>
-              <a:t>Implement mutual authentication so they can verify legitimacy before providing authentication credentials.</a:t>
-            </a:r>
-          </a:p>
-          <a:p>
-            <a:r>
-              <a:rPr lang="en-US" dirty="0"/>
-              <a:t>MFA is required for access</a:t>
-            </a:r>
-          </a:p>
-          <a:p>
-            <a:r>
-              <a:rPr lang="en-US" dirty="0"/>
-              <a:t>Additionally user should require authentication periodically in remote access devices, they should ensure if they made the base line required for internal systems.</a:t>
-            </a:r>
+              <a:t>Ensure that a user can </a:t>
+            </a:r>
+            <a:r>
+              <a:rPr lang="en-US" b="1" dirty="0"/>
+              <a:t>ACCESS</a:t>
+            </a:r>
+            <a:r>
+              <a:rPr lang="en-US" dirty="0"/>
+              <a:t> only </a:t>
+            </a:r>
+            <a:r>
+              <a:rPr lang="en-US" b="1" dirty="0"/>
+              <a:t>SPECIFIC INFORMATION </a:t>
+            </a:r>
+            <a:r>
+              <a:rPr lang="en-US" dirty="0"/>
+              <a:t>or </a:t>
+            </a:r>
+            <a:r>
+              <a:rPr lang="en-US" b="1" dirty="0"/>
+              <a:t>SPECIFIC CONTROL</a:t>
+            </a:r>
+            <a:r>
+              <a:rPr lang="en-US" dirty="0"/>
+              <a:t> in an organization or company.</a:t>
+            </a:r>
+          </a:p>
+          <a:p>
+            <a:pPr marL="0" indent="0">
+              <a:buNone/>
+            </a:pPr>
+            <a:r>
+              <a:rPr lang="en-US" dirty="0"/>
+              <a:t> Controls such as –</a:t>
+            </a:r>
+          </a:p>
+          <a:p>
+            <a:pPr marL="0" indent="0">
+              <a:buNone/>
+            </a:pPr>
+            <a:r>
+              <a:rPr lang="en-US" dirty="0"/>
+              <a:t>System administrators can only access to the active directories, CRUD a users etc.</a:t>
+            </a:r>
+          </a:p>
+          <a:p>
+            <a:pPr marL="0" indent="0">
+              <a:buNone/>
+            </a:pPr>
+            <a:r>
+              <a:rPr lang="en-US" dirty="0"/>
+              <a:t>HR Team controls employee information</a:t>
+            </a:r>
+          </a:p>
+          <a:p>
+            <a:pPr marL="0" indent="0">
+              <a:buNone/>
+            </a:pPr>
+            <a:endParaRPr lang="en-US" dirty="0"/>
+          </a:p>
+          <a:p>
+            <a:pPr marL="0" indent="0">
+              <a:buNone/>
+            </a:pPr>
+            <a:endParaRPr lang="en-US" dirty="0"/>
           </a:p>
         </p:txBody>
       </p:sp>
     </p:spTree>
     <p:extLst>
       <p:ext uri="{BB962C8B-B14F-4D97-AF65-F5344CB8AC3E}">
-        <p14:creationId xmlns:p14="http://schemas.microsoft.com/office/powerpoint/2010/main" val="1309017816"/>
+        <p14:creationId xmlns:p14="http://schemas.microsoft.com/office/powerpoint/2010/main" val="2706456986"/>
       </p:ext>
     </p:extLst>
   </p:cSld>
@@ -8272,7 +8504,7 @@
           <p:cNvPr id="2" name="Title 1">
             <a:extLst>
               <a:ext uri="{FF2B5EF4-FFF2-40B4-BE49-F238E27FC236}">
-                <a16:creationId xmlns:a16="http://schemas.microsoft.com/office/drawing/2014/main" id="{ED41F894-60A1-5384-512E-23F93C35274F}"/>
+                <a16:creationId xmlns:a16="http://schemas.microsoft.com/office/drawing/2014/main" id="{CEC3CB6A-5C62-FEC1-3624-1A34780E40F4}"/>
               </a:ext>
             </a:extLst>
           </p:cNvPr>
@@ -8290,7 +8522,7 @@
           <a:p>
             <a:r>
               <a:rPr lang="en-US" dirty="0"/>
-              <a:t>Network access control</a:t>
+              <a:t>Why User Access Control?</a:t>
             </a:r>
           </a:p>
         </p:txBody>
@@ -8300,7 +8532,7 @@
           <p:cNvPr id="3" name="Content Placeholder 2">
             <a:extLst>
               <a:ext uri="{FF2B5EF4-FFF2-40B4-BE49-F238E27FC236}">
-                <a16:creationId xmlns:a16="http://schemas.microsoft.com/office/drawing/2014/main" id="{690C7F1B-6CD7-D6B1-C402-1BCC1866FF1D}"/>
+                <a16:creationId xmlns:a16="http://schemas.microsoft.com/office/drawing/2014/main" id="{B7F35142-225D-F327-024A-9A5A2E7CECBB}"/>
               </a:ext>
             </a:extLst>
           </p:cNvPr>
@@ -8318,7 +8550,7 @@
           <a:p>
             <a:r>
               <a:rPr lang="en-US" dirty="0"/>
-              <a:t>Used to check remote access device based on its criteria, if it doesn’t meet a specific criteria access is denied.</a:t>
+              <a:t>To maintain confidentiality and data integrity of information. </a:t>
             </a:r>
           </a:p>
         </p:txBody>
@@ -8326,7 +8558,7 @@
     </p:spTree>
     <p:extLst>
       <p:ext uri="{BB962C8B-B14F-4D97-AF65-F5344CB8AC3E}">
-        <p14:creationId xmlns:p14="http://schemas.microsoft.com/office/powerpoint/2010/main" val="935807662"/>
+        <p14:creationId xmlns:p14="http://schemas.microsoft.com/office/powerpoint/2010/main" val="3714240421"/>
       </p:ext>
     </p:extLst>
   </p:cSld>
@@ -8358,7 +8590,7 @@
           <p:cNvPr id="2" name="Title 1">
             <a:extLst>
               <a:ext uri="{FF2B5EF4-FFF2-40B4-BE49-F238E27FC236}">
-                <a16:creationId xmlns:a16="http://schemas.microsoft.com/office/drawing/2014/main" id="{EB8AD0FA-DD8C-8E54-699B-D9F113E7DFDB}"/>
+                <a16:creationId xmlns:a16="http://schemas.microsoft.com/office/drawing/2014/main" id="{E2472BC1-F054-CB98-B844-4A698BCD359B}"/>
               </a:ext>
             </a:extLst>
           </p:cNvPr>
@@ -8376,7 +8608,7 @@
           <a:p>
             <a:r>
               <a:rPr lang="en-US" dirty="0"/>
-              <a:t>Teleworking access control</a:t>
+              <a:t>How to implement User Access Control?</a:t>
             </a:r>
           </a:p>
         </p:txBody>
@@ -8386,7 +8618,7 @@
           <p:cNvPr id="3" name="Content Placeholder 2">
             <a:extLst>
               <a:ext uri="{FF2B5EF4-FFF2-40B4-BE49-F238E27FC236}">
-                <a16:creationId xmlns:a16="http://schemas.microsoft.com/office/drawing/2014/main" id="{A434293C-74E3-27F7-7CFD-2B736111486C}"/>
+                <a16:creationId xmlns:a16="http://schemas.microsoft.com/office/drawing/2014/main" id="{C7790F32-6F6C-94D0-FBBF-98E60E10C5AB}"/>
               </a:ext>
             </a:extLst>
           </p:cNvPr>
@@ -8402,20 +8634,14 @@
           <a:bodyPr/>
           <a:lstStyle/>
           <a:p>
-            <a:r>
-              <a:rPr lang="en-US" dirty="0"/>
-              <a:t>Work flexibility arrangement under which employee performs his duties and responsibilities such as positions and other authorized activities from work site to location to work.</a:t>
-            </a:r>
-          </a:p>
-          <a:p>
-            <a:endParaRPr lang="en-US" dirty="0"/>
+            <a:endParaRPr lang="en-US"/>
           </a:p>
         </p:txBody>
       </p:sp>
     </p:spTree>
     <p:extLst>
       <p:ext uri="{BB962C8B-B14F-4D97-AF65-F5344CB8AC3E}">
-        <p14:creationId xmlns:p14="http://schemas.microsoft.com/office/powerpoint/2010/main" val="2106614610"/>
+        <p14:creationId xmlns:p14="http://schemas.microsoft.com/office/powerpoint/2010/main" val="2726068334"/>
       </p:ext>
     </p:extLst>
   </p:cSld>
@@ -8618,7 +8844,7 @@
           <p:cNvPr id="2" name="Title 1">
             <a:extLst>
               <a:ext uri="{FF2B5EF4-FFF2-40B4-BE49-F238E27FC236}">
-                <a16:creationId xmlns:a16="http://schemas.microsoft.com/office/drawing/2014/main" id="{5E896FC0-401B-A606-3B18-39834C0AC108}"/>
+                <a16:creationId xmlns:a16="http://schemas.microsoft.com/office/drawing/2014/main" id="{90A911F8-9259-B496-1E4A-4528A1311153}"/>
               </a:ext>
             </a:extLst>
           </p:cNvPr>
@@ -8635,10 +8861,9 @@
           <a:lstStyle/>
           <a:p>
             <a:r>
-              <a:rPr lang="en-US" dirty="0" err="1"/>
-              <a:t>Benifits</a:t>
-            </a:r>
-            <a:endParaRPr lang="en-US" dirty="0"/>
+              <a:rPr lang="en-US" dirty="0"/>
+              <a:t>Least Privilege or Zero Trust</a:t>
+            </a:r>
           </a:p>
         </p:txBody>
       </p:sp>
@@ -8647,7 +8872,7 @@
           <p:cNvPr id="3" name="Content Placeholder 2">
             <a:extLst>
               <a:ext uri="{FF2B5EF4-FFF2-40B4-BE49-F238E27FC236}">
-                <a16:creationId xmlns:a16="http://schemas.microsoft.com/office/drawing/2014/main" id="{56AD5E21-B889-6346-9EEE-147EC3A16C29}"/>
+                <a16:creationId xmlns:a16="http://schemas.microsoft.com/office/drawing/2014/main" id="{A982FFF2-C108-C5B9-6283-B636A0F90FCF}"/>
               </a:ext>
             </a:extLst>
           </p:cNvPr>
@@ -8663,47 +8888,398 @@
           <a:bodyPr/>
           <a:lstStyle/>
           <a:p>
-            <a:r>
-              <a:rPr lang="en-US" dirty="0"/>
-              <a:t>Increased motivation and productivity</a:t>
-            </a:r>
-          </a:p>
-          <a:p>
-            <a:r>
-              <a:rPr lang="en-US" dirty="0"/>
-              <a:t>Reduction in vehicle pollution </a:t>
-            </a:r>
-          </a:p>
-          <a:p>
-            <a:r>
-              <a:rPr lang="en-US" dirty="0"/>
-              <a:t>Improved work-life balance</a:t>
-            </a:r>
-          </a:p>
-          <a:p>
-            <a:r>
-              <a:rPr lang="en-US" dirty="0"/>
-              <a:t>Reduced dependency on imported oils</a:t>
-            </a:r>
-          </a:p>
-          <a:p>
-            <a:r>
-              <a:rPr lang="en-US" dirty="0"/>
-              <a:t>New opportunities </a:t>
-            </a:r>
-          </a:p>
-          <a:p>
-            <a:r>
-              <a:rPr lang="en-US" dirty="0"/>
-              <a:t>Establishment of distributed workflows</a:t>
-            </a:r>
+            <a:endParaRPr lang="en-US"/>
           </a:p>
         </p:txBody>
       </p:sp>
     </p:spTree>
     <p:extLst>
       <p:ext uri="{BB962C8B-B14F-4D97-AF65-F5344CB8AC3E}">
-        <p14:creationId xmlns:p14="http://schemas.microsoft.com/office/powerpoint/2010/main" val="676721497"/>
+        <p14:creationId xmlns:p14="http://schemas.microsoft.com/office/powerpoint/2010/main" val="4187362898"/>
+      </p:ext>
+    </p:extLst>
+  </p:cSld>
+  <p:clrMapOvr>
+    <a:masterClrMapping/>
+  </p:clrMapOvr>
+</p:sld>
+</file>
+
+<file path=ppt/slides/slide41.xml><?xml version="1.0" encoding="utf-8"?>
+<p:sld xmlns:a="http://schemas.openxmlformats.org/drawingml/2006/main" xmlns:r="http://schemas.openxmlformats.org/officeDocument/2006/relationships" xmlns:p="http://schemas.openxmlformats.org/presentationml/2006/main">
+  <p:cSld>
+    <p:spTree>
+      <p:nvGrpSpPr>
+        <p:cNvPr id="1" name=""/>
+        <p:cNvGrpSpPr/>
+        <p:nvPr/>
+      </p:nvGrpSpPr>
+      <p:grpSpPr>
+        <a:xfrm>
+          <a:off x="0" y="0"/>
+          <a:ext cx="0" cy="0"/>
+          <a:chOff x="0" y="0"/>
+          <a:chExt cx="0" cy="0"/>
+        </a:xfrm>
+      </p:grpSpPr>
+      <p:sp>
+        <p:nvSpPr>
+          <p:cNvPr id="2" name="Title 1">
+            <a:extLst>
+              <a:ext uri="{FF2B5EF4-FFF2-40B4-BE49-F238E27FC236}">
+                <a16:creationId xmlns:a16="http://schemas.microsoft.com/office/drawing/2014/main" id="{95FD279A-1AA8-56BE-BD14-B4109C3D73F7}"/>
+              </a:ext>
+            </a:extLst>
+          </p:cNvPr>
+          <p:cNvSpPr>
+            <a:spLocks noGrp="1"/>
+          </p:cNvSpPr>
+          <p:nvPr>
+            <p:ph type="title"/>
+          </p:nvPr>
+        </p:nvSpPr>
+        <p:spPr/>
+        <p:txBody>
+          <a:bodyPr/>
+          <a:lstStyle/>
+          <a:p>
+            <a:r>
+              <a:rPr lang="en-US" dirty="0"/>
+              <a:t>Policies for Authorization</a:t>
+            </a:r>
+          </a:p>
+        </p:txBody>
+      </p:sp>
+      <p:sp>
+        <p:nvSpPr>
+          <p:cNvPr id="3" name="Content Placeholder 2">
+            <a:extLst>
+              <a:ext uri="{FF2B5EF4-FFF2-40B4-BE49-F238E27FC236}">
+                <a16:creationId xmlns:a16="http://schemas.microsoft.com/office/drawing/2014/main" id="{34C625B8-B55B-B8D1-23EF-859645697FB6}"/>
+              </a:ext>
+            </a:extLst>
+          </p:cNvPr>
+          <p:cNvSpPr>
+            <a:spLocks noGrp="1"/>
+          </p:cNvSpPr>
+          <p:nvPr>
+            <p:ph idx="1"/>
+          </p:nvPr>
+        </p:nvSpPr>
+        <p:spPr/>
+        <p:txBody>
+          <a:bodyPr/>
+          <a:lstStyle/>
+          <a:p>
+            <a:endParaRPr lang="en-US" dirty="0"/>
+          </a:p>
+        </p:txBody>
+      </p:sp>
+    </p:spTree>
+    <p:extLst>
+      <p:ext uri="{BB962C8B-B14F-4D97-AF65-F5344CB8AC3E}">
+        <p14:creationId xmlns:p14="http://schemas.microsoft.com/office/powerpoint/2010/main" val="2359284174"/>
+      </p:ext>
+    </p:extLst>
+  </p:cSld>
+  <p:clrMapOvr>
+    <a:masterClrMapping/>
+  </p:clrMapOvr>
+</p:sld>
+</file>
+
+<file path=ppt/slides/slide42.xml><?xml version="1.0" encoding="utf-8"?>
+<p:sld xmlns:a="http://schemas.openxmlformats.org/drawingml/2006/main" xmlns:r="http://schemas.openxmlformats.org/officeDocument/2006/relationships" xmlns:p="http://schemas.openxmlformats.org/presentationml/2006/main">
+  <p:cSld>
+    <p:spTree>
+      <p:nvGrpSpPr>
+        <p:cNvPr id="1" name=""/>
+        <p:cNvGrpSpPr/>
+        <p:nvPr/>
+      </p:nvGrpSpPr>
+      <p:grpSpPr>
+        <a:xfrm>
+          <a:off x="0" y="0"/>
+          <a:ext cx="0" cy="0"/>
+          <a:chOff x="0" y="0"/>
+          <a:chExt cx="0" cy="0"/>
+        </a:xfrm>
+      </p:grpSpPr>
+      <p:sp>
+        <p:nvSpPr>
+          <p:cNvPr id="2" name="Title 1">
+            <a:extLst>
+              <a:ext uri="{FF2B5EF4-FFF2-40B4-BE49-F238E27FC236}">
+                <a16:creationId xmlns:a16="http://schemas.microsoft.com/office/drawing/2014/main" id="{7FC12AFE-2E6D-173C-B204-17FF3919CCDD}"/>
+              </a:ext>
+            </a:extLst>
+          </p:cNvPr>
+          <p:cNvSpPr>
+            <a:spLocks noGrp="1"/>
+          </p:cNvSpPr>
+          <p:nvPr>
+            <p:ph type="title"/>
+          </p:nvPr>
+        </p:nvSpPr>
+        <p:spPr/>
+        <p:txBody>
+          <a:bodyPr/>
+          <a:lstStyle/>
+          <a:p>
+            <a:r>
+              <a:rPr lang="en-US" dirty="0"/>
+              <a:t>Privileged controls</a:t>
+            </a:r>
+          </a:p>
+        </p:txBody>
+      </p:sp>
+      <p:sp>
+        <p:nvSpPr>
+          <p:cNvPr id="3" name="Content Placeholder 2">
+            <a:extLst>
+              <a:ext uri="{FF2B5EF4-FFF2-40B4-BE49-F238E27FC236}">
+                <a16:creationId xmlns:a16="http://schemas.microsoft.com/office/drawing/2014/main" id="{C01240D6-045E-5C72-1498-2CAAF379692C}"/>
+              </a:ext>
+            </a:extLst>
+          </p:cNvPr>
+          <p:cNvSpPr>
+            <a:spLocks noGrp="1"/>
+          </p:cNvSpPr>
+          <p:nvPr>
+            <p:ph idx="1"/>
+          </p:nvPr>
+        </p:nvSpPr>
+        <p:spPr/>
+        <p:txBody>
+          <a:bodyPr/>
+          <a:lstStyle/>
+          <a:p>
+            <a:r>
+              <a:rPr lang="en-US" dirty="0"/>
+              <a:t>Accounts with elevated capabilities beyond regular users.</a:t>
+            </a:r>
+          </a:p>
+          <a:p>
+            <a:r>
+              <a:rPr lang="en-US" dirty="0"/>
+              <a:t>Accounts with Network admins, System admins etc.</a:t>
+            </a:r>
+          </a:p>
+          <a:p>
+            <a:endParaRPr lang="en-US" dirty="0"/>
+          </a:p>
+        </p:txBody>
+      </p:sp>
+    </p:spTree>
+    <p:extLst>
+      <p:ext uri="{BB962C8B-B14F-4D97-AF65-F5344CB8AC3E}">
+        <p14:creationId xmlns:p14="http://schemas.microsoft.com/office/powerpoint/2010/main" val="1896068859"/>
+      </p:ext>
+    </p:extLst>
+  </p:cSld>
+  <p:clrMapOvr>
+    <a:masterClrMapping/>
+  </p:clrMapOvr>
+</p:sld>
+</file>
+
+<file path=ppt/slides/slide43.xml><?xml version="1.0" encoding="utf-8"?>
+<p:sld xmlns:a="http://schemas.openxmlformats.org/drawingml/2006/main" xmlns:r="http://schemas.openxmlformats.org/officeDocument/2006/relationships" xmlns:p="http://schemas.openxmlformats.org/presentationml/2006/main">
+  <p:cSld>
+    <p:spTree>
+      <p:nvGrpSpPr>
+        <p:cNvPr id="1" name=""/>
+        <p:cNvGrpSpPr/>
+        <p:nvPr/>
+      </p:nvGrpSpPr>
+      <p:grpSpPr>
+        <a:xfrm>
+          <a:off x="0" y="0"/>
+          <a:ext cx="0" cy="0"/>
+          <a:chOff x="0" y="0"/>
+          <a:chExt cx="0" cy="0"/>
+        </a:xfrm>
+      </p:grpSpPr>
+      <p:sp>
+        <p:nvSpPr>
+          <p:cNvPr id="2" name="Title 1">
+            <a:extLst>
+              <a:ext uri="{FF2B5EF4-FFF2-40B4-BE49-F238E27FC236}">
+                <a16:creationId xmlns:a16="http://schemas.microsoft.com/office/drawing/2014/main" id="{082A68DD-DC3B-6A39-CC42-F920D3F6472C}"/>
+              </a:ext>
+            </a:extLst>
+          </p:cNvPr>
+          <p:cNvSpPr>
+            <a:spLocks noGrp="1"/>
+          </p:cNvSpPr>
+          <p:nvPr>
+            <p:ph type="title"/>
+          </p:nvPr>
+        </p:nvSpPr>
+        <p:spPr/>
+        <p:txBody>
+          <a:bodyPr/>
+          <a:lstStyle/>
+          <a:p>
+            <a:r>
+              <a:rPr lang="en-US" dirty="0" err="1"/>
+              <a:t>Segration</a:t>
+            </a:r>
+            <a:r>
+              <a:rPr lang="en-US" dirty="0"/>
+              <a:t> of Duties</a:t>
+            </a:r>
+          </a:p>
+        </p:txBody>
+      </p:sp>
+      <p:sp>
+        <p:nvSpPr>
+          <p:cNvPr id="3" name="Content Placeholder 2">
+            <a:extLst>
+              <a:ext uri="{FF2B5EF4-FFF2-40B4-BE49-F238E27FC236}">
+                <a16:creationId xmlns:a16="http://schemas.microsoft.com/office/drawing/2014/main" id="{0ACB17F9-A466-0C4A-5605-DD87BA5C508C}"/>
+              </a:ext>
+            </a:extLst>
+          </p:cNvPr>
+          <p:cNvSpPr>
+            <a:spLocks noGrp="1"/>
+          </p:cNvSpPr>
+          <p:nvPr>
+            <p:ph idx="1"/>
+          </p:nvPr>
+        </p:nvSpPr>
+        <p:spPr/>
+        <p:txBody>
+          <a:bodyPr/>
+          <a:lstStyle/>
+          <a:p>
+            <a:r>
+              <a:rPr lang="en-US" dirty="0"/>
+              <a:t>Why? It’s dangerous to give too much power to a single person</a:t>
+            </a:r>
+          </a:p>
+          <a:p>
+            <a:r>
+              <a:rPr lang="en-US" dirty="0"/>
+              <a:t>Requires 2 or more person permission to complete a task</a:t>
+            </a:r>
+          </a:p>
+          <a:p>
+            <a:endParaRPr lang="en-US" dirty="0"/>
+          </a:p>
+          <a:p>
+            <a:endParaRPr lang="en-US" dirty="0"/>
+          </a:p>
+          <a:p>
+            <a:r>
+              <a:rPr lang="en-US" dirty="0"/>
+              <a:t>How can it help us?</a:t>
+            </a:r>
+          </a:p>
+          <a:p>
+            <a:r>
+              <a:rPr lang="en-US" dirty="0"/>
+              <a:t>- Protect from insider threats</a:t>
+            </a:r>
+          </a:p>
+        </p:txBody>
+      </p:sp>
+    </p:spTree>
+    <p:extLst>
+      <p:ext uri="{BB962C8B-B14F-4D97-AF65-F5344CB8AC3E}">
+        <p14:creationId xmlns:p14="http://schemas.microsoft.com/office/powerpoint/2010/main" val="1961223043"/>
+      </p:ext>
+    </p:extLst>
+  </p:cSld>
+  <p:clrMapOvr>
+    <a:masterClrMapping/>
+  </p:clrMapOvr>
+</p:sld>
+</file>
+
+<file path=ppt/slides/slide44.xml><?xml version="1.0" encoding="utf-8"?>
+<p:sld xmlns:a="http://schemas.openxmlformats.org/drawingml/2006/main" xmlns:r="http://schemas.openxmlformats.org/officeDocument/2006/relationships" xmlns:p="http://schemas.openxmlformats.org/presentationml/2006/main">
+  <p:cSld>
+    <p:spTree>
+      <p:nvGrpSpPr>
+        <p:cNvPr id="1" name=""/>
+        <p:cNvGrpSpPr/>
+        <p:nvPr/>
+      </p:nvGrpSpPr>
+      <p:grpSpPr>
+        <a:xfrm>
+          <a:off x="0" y="0"/>
+          <a:ext cx="0" cy="0"/>
+          <a:chOff x="0" y="0"/>
+          <a:chExt cx="0" cy="0"/>
+        </a:xfrm>
+      </p:grpSpPr>
+      <p:sp>
+        <p:nvSpPr>
+          <p:cNvPr id="2" name="Title 1">
+            <a:extLst>
+              <a:ext uri="{FF2B5EF4-FFF2-40B4-BE49-F238E27FC236}">
+                <a16:creationId xmlns:a16="http://schemas.microsoft.com/office/drawing/2014/main" id="{6944D5D3-5EB6-A764-8FA6-FE4771C983FB}"/>
+              </a:ext>
+            </a:extLst>
+          </p:cNvPr>
+          <p:cNvSpPr>
+            <a:spLocks noGrp="1"/>
+          </p:cNvSpPr>
+          <p:nvPr>
+            <p:ph type="title"/>
+          </p:nvPr>
+        </p:nvSpPr>
+        <p:spPr/>
+        <p:txBody>
+          <a:bodyPr/>
+          <a:lstStyle/>
+          <a:p>
+            <a:r>
+              <a:rPr lang="en-US" dirty="0"/>
+              <a:t>Dual Control</a:t>
+            </a:r>
+          </a:p>
+        </p:txBody>
+      </p:sp>
+      <p:sp>
+        <p:nvSpPr>
+          <p:cNvPr id="3" name="Content Placeholder 2">
+            <a:extLst>
+              <a:ext uri="{FF2B5EF4-FFF2-40B4-BE49-F238E27FC236}">
+                <a16:creationId xmlns:a16="http://schemas.microsoft.com/office/drawing/2014/main" id="{99EC6FAD-D928-EFE9-43EE-6F80CDB01E1A}"/>
+              </a:ext>
+            </a:extLst>
+          </p:cNvPr>
+          <p:cNvSpPr>
+            <a:spLocks noGrp="1"/>
+          </p:cNvSpPr>
+          <p:nvPr>
+            <p:ph idx="1"/>
+          </p:nvPr>
+        </p:nvSpPr>
+        <p:spPr/>
+        <p:txBody>
+          <a:bodyPr/>
+          <a:lstStyle/>
+          <a:p>
+            <a:r>
+              <a:rPr lang="en-US" dirty="0"/>
+              <a:t>2 keys to open a door</a:t>
+            </a:r>
+          </a:p>
+          <a:p>
+            <a:pPr marL="0" indent="0">
+              <a:buNone/>
+            </a:pPr>
+            <a:endParaRPr lang="en-US" dirty="0"/>
+          </a:p>
+        </p:txBody>
+      </p:sp>
+    </p:spTree>
+    <p:extLst>
+      <p:ext uri="{BB962C8B-B14F-4D97-AF65-F5344CB8AC3E}">
+        <p14:creationId xmlns:p14="http://schemas.microsoft.com/office/powerpoint/2010/main" val="2048770458"/>
       </p:ext>
     </p:extLst>
   </p:cSld>

</xml_diff>

<commit_message>
Optimized fonts and images
</commit_message>
<xml_diff>
--- a/Access Control.pptx
+++ b/Access Control.pptx
@@ -155,6 +155,65 @@
     </a:lvl9pPr>
   </p:defaultTextStyle>
   <p:extLst>
+    <p:ext uri="{521415D9-36F7-43E2-AB2F-B90AF26B5E84}">
+      <p14:sectionLst xmlns:p14="http://schemas.microsoft.com/office/powerpoint/2010/main">
+        <p14:section name="Default Section" id="{2BA019AD-AEA8-41DB-9A22-032E40E53CDE}">
+          <p14:sldIdLst>
+            <p14:sldId id="256"/>
+            <p14:sldId id="282"/>
+            <p14:sldId id="283"/>
+            <p14:sldId id="284"/>
+            <p14:sldId id="285"/>
+            <p14:sldId id="286"/>
+            <p14:sldId id="287"/>
+            <p14:sldId id="288"/>
+            <p14:sldId id="290"/>
+            <p14:sldId id="289"/>
+            <p14:sldId id="291"/>
+            <p14:sldId id="292"/>
+            <p14:sldId id="293"/>
+            <p14:sldId id="257"/>
+            <p14:sldId id="314"/>
+            <p14:sldId id="258"/>
+            <p14:sldId id="259"/>
+            <p14:sldId id="264"/>
+            <p14:sldId id="265"/>
+            <p14:sldId id="266"/>
+            <p14:sldId id="267"/>
+            <p14:sldId id="268"/>
+            <p14:sldId id="269"/>
+            <p14:sldId id="270"/>
+            <p14:sldId id="271"/>
+            <p14:sldId id="272"/>
+            <p14:sldId id="273"/>
+            <p14:sldId id="274"/>
+            <p14:sldId id="275"/>
+            <p14:sldId id="276"/>
+            <p14:sldId id="278"/>
+            <p14:sldId id="279"/>
+            <p14:sldId id="280"/>
+            <p14:sldId id="281"/>
+            <p14:sldId id="296"/>
+            <p14:sldId id="297"/>
+            <p14:sldId id="298"/>
+            <p14:sldId id="299"/>
+            <p14:sldId id="300"/>
+            <p14:sldId id="312"/>
+            <p14:sldId id="301"/>
+            <p14:sldId id="302"/>
+            <p14:sldId id="306"/>
+            <p14:sldId id="303"/>
+            <p14:sldId id="304"/>
+            <p14:sldId id="313"/>
+            <p14:sldId id="305"/>
+            <p14:sldId id="307"/>
+            <p14:sldId id="308"/>
+            <p14:sldId id="309"/>
+            <p14:sldId id="311"/>
+          </p14:sldIdLst>
+        </p14:section>
+      </p14:sectionLst>
+    </p:ext>
     <p:ext uri="{EFAFB233-063F-42B5-8137-9DF3F51BA10A}">
       <p15:sldGuideLst xmlns:p15="http://schemas.microsoft.com/office/powerpoint/2012/main"/>
     </p:ext>
@@ -13497,8 +13556,8 @@
         </p:nvSpPr>
         <p:spPr>
           <a:xfrm>
-            <a:off x="744028" y="568256"/>
-            <a:ext cx="10694598" cy="5296578"/>
+            <a:off x="748701" y="1846450"/>
+            <a:ext cx="10694598" cy="4221284"/>
           </a:xfrm>
           <a:prstGeom prst="rect">
             <a:avLst/>
@@ -13520,63 +13579,26 @@
               </a:spcAft>
             </a:pPr>
             <a:r>
-              <a:rPr lang="en-CA" sz="4400" b="1" dirty="0">
+              <a:rPr lang="en-CA" sz="2400" dirty="0">
                 <a:solidFill>
                   <a:schemeClr val="bg1">
                     <a:lumMod val="95000"/>
                   </a:schemeClr>
                 </a:solidFill>
                 <a:effectLst/>
-                <a:latin typeface="Calibri" panose="020F0502020204030204" pitchFamily="34" charset="0"/>
                 <a:ea typeface="Calibri" panose="020F0502020204030204" pitchFamily="34" charset="0"/>
                 <a:cs typeface="Times New Roman" panose="02020603050405020304" pitchFamily="18" charset="0"/>
               </a:rPr>
-              <a:t>Authentication by Characteristic –</a:t>
-            </a:r>
-            <a:endParaRPr lang="en-CA" sz="4400" dirty="0">
-              <a:solidFill>
-                <a:schemeClr val="bg1">
-                  <a:lumMod val="95000"/>
-                </a:schemeClr>
-              </a:solidFill>
-              <a:effectLst/>
-              <a:latin typeface="Calibri" panose="020F0502020204030204" pitchFamily="34" charset="0"/>
-              <a:ea typeface="Calibri" panose="020F0502020204030204" pitchFamily="34" charset="0"/>
-              <a:cs typeface="Times New Roman" panose="02020603050405020304" pitchFamily="18" charset="0"/>
-            </a:endParaRPr>
-          </a:p>
-          <a:p>
-            <a:pPr>
-              <a:lnSpc>
-                <a:spcPct val="107000"/>
-              </a:lnSpc>
-              <a:spcAft>
-                <a:spcPts val="800"/>
-              </a:spcAft>
-            </a:pPr>
-            <a:r>
-              <a:rPr lang="en-CA" sz="2400" dirty="0">
+              <a:t>Authentication by characteristic, often known as a biometric attribute, authentication verifies the user based on a physical or behavioural characteristic. The following physical or physiological traits are the most prevalent</a:t>
+            </a:r>
+            <a:r>
+              <a:rPr lang="en-CA" sz="2400" b="1" dirty="0">
                 <a:solidFill>
                   <a:schemeClr val="bg1">
                     <a:lumMod val="95000"/>
                   </a:schemeClr>
                 </a:solidFill>
                 <a:effectLst/>
-                <a:latin typeface="Calibri" panose="020F0502020204030204" pitchFamily="34" charset="0"/>
-                <a:ea typeface="Calibri" panose="020F0502020204030204" pitchFamily="34" charset="0"/>
-                <a:cs typeface="Times New Roman" panose="02020603050405020304" pitchFamily="18" charset="0"/>
-              </a:rPr>
-              <a:t>Authentication by characteristic, often known as a biometric attribute, authentication verifies the user based on a physical or behavioral characteristic. The following physical or physiological traits are the most prevalent</a:t>
-            </a:r>
-            <a:r>
-              <a:rPr lang="en-CA" sz="2400" b="1" dirty="0">
-                <a:solidFill>
-                  <a:schemeClr val="bg1">
-                    <a:lumMod val="95000"/>
-                  </a:schemeClr>
-                </a:solidFill>
-                <a:effectLst/>
-                <a:latin typeface="Calibri" panose="020F0502020204030204" pitchFamily="34" charset="0"/>
                 <a:ea typeface="Calibri" panose="020F0502020204030204" pitchFamily="34" charset="0"/>
                 <a:cs typeface="Times New Roman" panose="02020603050405020304" pitchFamily="18" charset="0"/>
               </a:rPr>
@@ -13591,14 +13613,13 @@
               <a:buSzPts val="1100"/>
             </a:pPr>
             <a:r>
-              <a:rPr lang="en-CA" sz="2800" dirty="0">
+              <a:rPr lang="en-CA" sz="2400" dirty="0">
                 <a:solidFill>
                   <a:schemeClr val="bg1">
                     <a:lumMod val="95000"/>
                   </a:schemeClr>
                 </a:solidFill>
                 <a:effectLst/>
-                <a:latin typeface="Calibri" panose="020F0502020204030204" pitchFamily="34" charset="0"/>
                 <a:ea typeface="Calibri" panose="020F0502020204030204" pitchFamily="34" charset="0"/>
                 <a:cs typeface="Times New Roman" panose="02020603050405020304" pitchFamily="18" charset="0"/>
               </a:rPr>
@@ -13613,14 +13634,13 @@
               <a:buSzPts val="1100"/>
             </a:pPr>
             <a:r>
-              <a:rPr lang="en-CA" sz="2800" dirty="0">
+              <a:rPr lang="en-CA" sz="2400" dirty="0">
                 <a:solidFill>
                   <a:schemeClr val="bg1">
                     <a:lumMod val="95000"/>
                   </a:schemeClr>
                 </a:solidFill>
                 <a:effectLst/>
-                <a:latin typeface="Calibri" panose="020F0502020204030204" pitchFamily="34" charset="0"/>
                 <a:ea typeface="Calibri" panose="020F0502020204030204" pitchFamily="34" charset="0"/>
                 <a:cs typeface="Times New Roman" panose="02020603050405020304" pitchFamily="18" charset="0"/>
               </a:rPr>
@@ -13635,14 +13655,13 @@
               <a:buSzPts val="1100"/>
             </a:pPr>
             <a:r>
-              <a:rPr lang="en-CA" sz="2800" dirty="0">
+              <a:rPr lang="en-CA" sz="2400" dirty="0">
                 <a:solidFill>
                   <a:schemeClr val="bg1">
                     <a:lumMod val="95000"/>
                   </a:schemeClr>
                 </a:solidFill>
                 <a:effectLst/>
-                <a:latin typeface="Calibri" panose="020F0502020204030204" pitchFamily="34" charset="0"/>
                 <a:ea typeface="Calibri" panose="020F0502020204030204" pitchFamily="34" charset="0"/>
                 <a:cs typeface="Times New Roman" panose="02020603050405020304" pitchFamily="18" charset="0"/>
               </a:rPr>
@@ -13657,14 +13676,13 @@
               <a:buSzPts val="1100"/>
             </a:pPr>
             <a:r>
-              <a:rPr lang="en-CA" sz="2800" dirty="0">
+              <a:rPr lang="en-CA" sz="2400" dirty="0">
                 <a:solidFill>
                   <a:schemeClr val="bg1">
                     <a:lumMod val="95000"/>
                   </a:schemeClr>
                 </a:solidFill>
                 <a:effectLst/>
-                <a:latin typeface="Calibri" panose="020F0502020204030204" pitchFamily="34" charset="0"/>
                 <a:ea typeface="Calibri" panose="020F0502020204030204" pitchFamily="34" charset="0"/>
                 <a:cs typeface="Times New Roman" panose="02020603050405020304" pitchFamily="18" charset="0"/>
               </a:rPr>
@@ -13679,14 +13697,13 @@
               <a:buSzPts val="1100"/>
             </a:pPr>
             <a:r>
-              <a:rPr lang="en-CA" sz="2800" dirty="0">
+              <a:rPr lang="en-CA" sz="2400" dirty="0">
                 <a:solidFill>
                   <a:schemeClr val="bg1">
                     <a:lumMod val="95000"/>
                   </a:schemeClr>
                 </a:solidFill>
                 <a:effectLst/>
-                <a:latin typeface="Calibri" panose="020F0502020204030204" pitchFamily="34" charset="0"/>
                 <a:ea typeface="Calibri" panose="020F0502020204030204" pitchFamily="34" charset="0"/>
                 <a:cs typeface="Times New Roman" panose="02020603050405020304" pitchFamily="18" charset="0"/>
               </a:rPr>
@@ -13704,14 +13721,13 @@
               <a:buSzPts val="1100"/>
             </a:pPr>
             <a:r>
-              <a:rPr lang="en-CA" sz="2800" dirty="0">
+              <a:rPr lang="en-CA" sz="2400" dirty="0">
                 <a:solidFill>
                   <a:schemeClr val="bg1">
                     <a:lumMod val="95000"/>
                   </a:schemeClr>
                 </a:solidFill>
                 <a:effectLst/>
-                <a:latin typeface="Calibri" panose="020F0502020204030204" pitchFamily="34" charset="0"/>
                 <a:ea typeface="Calibri" panose="020F0502020204030204" pitchFamily="34" charset="0"/>
                 <a:cs typeface="Times New Roman" panose="02020603050405020304" pitchFamily="18" charset="0"/>
               </a:rPr>
@@ -13727,17 +13743,69 @@
                 <a:spcPts val="800"/>
               </a:spcAft>
             </a:pPr>
-            <a:endParaRPr lang="en-CA" sz="1400" dirty="0">
+            <a:endParaRPr lang="en-CA" sz="2400" dirty="0">
               <a:solidFill>
                 <a:schemeClr val="bg1">
                   <a:lumMod val="95000"/>
                 </a:schemeClr>
               </a:solidFill>
               <a:effectLst/>
-              <a:latin typeface="Calibri" panose="020F0502020204030204" pitchFamily="34" charset="0"/>
               <a:ea typeface="Calibri" panose="020F0502020204030204" pitchFamily="34" charset="0"/>
               <a:cs typeface="Times New Roman" panose="02020603050405020304" pitchFamily="18" charset="0"/>
             </a:endParaRPr>
+          </a:p>
+        </p:txBody>
+      </p:sp>
+      <p:sp>
+        <p:nvSpPr>
+          <p:cNvPr id="2" name="TextBox 1">
+            <a:extLst>
+              <a:ext uri="{FF2B5EF4-FFF2-40B4-BE49-F238E27FC236}">
+                <a16:creationId xmlns:a16="http://schemas.microsoft.com/office/drawing/2014/main" id="{7CF68792-DDEF-322B-B17D-7B3C12326B9F}"/>
+              </a:ext>
+            </a:extLst>
+          </p:cNvPr>
+          <p:cNvSpPr txBox="1"/>
+          <p:nvPr/>
+        </p:nvSpPr>
+        <p:spPr>
+          <a:xfrm>
+            <a:off x="748701" y="514179"/>
+            <a:ext cx="10694598" cy="712696"/>
+          </a:xfrm>
+          <a:prstGeom prst="rect">
+            <a:avLst/>
+          </a:prstGeom>
+          <a:noFill/>
+        </p:spPr>
+        <p:txBody>
+          <a:bodyPr wrap="square">
+            <a:spAutoFit/>
+          </a:bodyPr>
+          <a:lstStyle/>
+          <a:p>
+            <a:pPr>
+              <a:lnSpc>
+                <a:spcPct val="107000"/>
+              </a:lnSpc>
+              <a:spcAft>
+                <a:spcPts val="800"/>
+              </a:spcAft>
+            </a:pPr>
+            <a:r>
+              <a:rPr lang="en-CA" sz="4000" dirty="0">
+                <a:solidFill>
+                  <a:schemeClr val="bg1">
+                    <a:lumMod val="95000"/>
+                  </a:schemeClr>
+                </a:solidFill>
+                <a:effectLst/>
+                <a:latin typeface="+mj-lt"/>
+                <a:ea typeface="Calibri" panose="020F0502020204030204" pitchFamily="34" charset="0"/>
+                <a:cs typeface="Times New Roman" panose="02020603050405020304" pitchFamily="18" charset="0"/>
+              </a:rPr>
+              <a:t>Authentication By Characteristics -</a:t>
+            </a:r>
           </a:p>
         </p:txBody>
       </p:sp>
@@ -13786,7 +13854,7 @@
         <p:spPr>
           <a:xfrm>
             <a:off x="2041227" y="86264"/>
-            <a:ext cx="8374092" cy="2554545"/>
+            <a:ext cx="8374092" cy="3293209"/>
           </a:xfrm>
           <a:prstGeom prst="rect">
             <a:avLst/>
@@ -13800,12 +13868,12 @@
           <a:lstStyle/>
           <a:p>
             <a:r>
-              <a:rPr lang="en-CA" sz="4000" b="1" dirty="0">
+              <a:rPr lang="en-CA" sz="4000" dirty="0">
                 <a:solidFill>
                   <a:schemeClr val="bg2"/>
                 </a:solidFill>
                 <a:effectLst/>
-                <a:latin typeface="Calibri" panose="020F0502020204030204" pitchFamily="34" charset="0"/>
+                <a:latin typeface="+mj-lt"/>
                 <a:ea typeface="Calibri" panose="020F0502020204030204" pitchFamily="34" charset="0"/>
                 <a:cs typeface="Times New Roman" panose="02020603050405020304" pitchFamily="18" charset="0"/>
               </a:rPr>
@@ -13817,7 +13885,6 @@
                   <a:schemeClr val="bg2"/>
                 </a:solidFill>
                 <a:effectLst/>
-                <a:latin typeface="Calibri" panose="020F0502020204030204" pitchFamily="34" charset="0"/>
                 <a:ea typeface="Calibri" panose="020F0502020204030204" pitchFamily="34" charset="0"/>
                 <a:cs typeface="Times New Roman" panose="02020603050405020304" pitchFamily="18" charset="0"/>
               </a:rPr>
@@ -13829,24 +13896,26 @@
               <a:solidFill>
                 <a:schemeClr val="bg2"/>
               </a:solidFill>
-              <a:latin typeface="Calibri" panose="020F0502020204030204" pitchFamily="34" charset="0"/>
               <a:cs typeface="Times New Roman" panose="02020603050405020304" pitchFamily="18" charset="0"/>
             </a:endParaRPr>
           </a:p>
           <a:p>
-            <a:r>
-              <a:rPr lang="en-CA" sz="2400" b="1" dirty="0">
-                <a:solidFill>
-                  <a:schemeClr val="bg2"/>
-                </a:solidFill>
-              </a:rPr>
-              <a:t>An authentication method that requires the user to provide two or more verification factors to gain access to a resource such as an application, online account, or a VPN</a:t>
-            </a:r>
             <a:endParaRPr lang="en-CA" sz="2400" dirty="0">
               <a:solidFill>
                 <a:schemeClr val="bg2"/>
               </a:solidFill>
+              <a:cs typeface="Times New Roman" panose="02020603050405020304" pitchFamily="18" charset="0"/>
             </a:endParaRPr>
+          </a:p>
+          <a:p>
+            <a:r>
+              <a:rPr lang="en-CA" sz="2400" dirty="0">
+                <a:solidFill>
+                  <a:schemeClr val="bg2"/>
+                </a:solidFill>
+              </a:rPr>
+              <a:t>An authentication method that requires the user to provide two or more verification factors to gain access to a resource such as an application, online account, or a VPN</a:t>
+            </a:r>
           </a:p>
         </p:txBody>
       </p:sp>
@@ -13878,8 +13947,8 @@
         </p:blipFill>
         <p:spPr>
           <a:xfrm>
-            <a:off x="1" y="3001992"/>
-            <a:ext cx="12456544" cy="3769744"/>
+            <a:off x="0" y="3429000"/>
+            <a:ext cx="12192000" cy="3429000"/>
           </a:xfrm>
           <a:prstGeom prst="rect">
             <a:avLst/>
@@ -13930,8 +13999,8 @@
         </p:nvSpPr>
         <p:spPr>
           <a:xfrm>
-            <a:off x="146649" y="3141088"/>
-            <a:ext cx="12105736" cy="3577454"/>
+            <a:off x="195811" y="2344675"/>
+            <a:ext cx="12105736" cy="3050515"/>
           </a:xfrm>
           <a:prstGeom prst="rect">
             <a:avLst/>
@@ -13953,18 +14022,6 @@
               </a:spcAft>
             </a:pPr>
             <a:r>
-              <a:rPr lang="en-CA" sz="3200" b="1" dirty="0">
-                <a:solidFill>
-                  <a:schemeClr val="bg2"/>
-                </a:solidFill>
-                <a:effectLst/>
-                <a:latin typeface="Calibri" panose="020F0502020204030204" pitchFamily="34" charset="0"/>
-                <a:ea typeface="Calibri" panose="020F0502020204030204" pitchFamily="34" charset="0"/>
-                <a:cs typeface="Times New Roman" panose="02020603050405020304" pitchFamily="18" charset="0"/>
-              </a:rPr>
-              <a:t>Accountability or Audit –  </a:t>
-            </a:r>
-            <a:r>
               <a:rPr lang="en-CA" sz="2000" dirty="0">
                 <a:solidFill>
                   <a:schemeClr val="bg2"/>
@@ -14136,42 +14193,57 @@
           </a:p>
         </p:txBody>
       </p:sp>
-      <p:pic>
-        <p:nvPicPr>
-          <p:cNvPr id="5" name="Picture 4">
+      <p:sp>
+        <p:nvSpPr>
+          <p:cNvPr id="2" name="TextBox 1">
             <a:extLst>
               <a:ext uri="{FF2B5EF4-FFF2-40B4-BE49-F238E27FC236}">
-                <a16:creationId xmlns:a16="http://schemas.microsoft.com/office/drawing/2014/main" id="{8D11B1E7-D6B4-F155-DFAA-926F50F435AC}"/>
+                <a16:creationId xmlns:a16="http://schemas.microsoft.com/office/drawing/2014/main" id="{EFF6DB14-A0CC-6177-1E21-836DF146B186}"/>
               </a:ext>
             </a:extLst>
           </p:cNvPr>
-          <p:cNvPicPr>
-            <a:picLocks noChangeAspect="1"/>
-          </p:cNvPicPr>
+          <p:cNvSpPr txBox="1"/>
           <p:nvPr/>
-        </p:nvPicPr>
-        <p:blipFill>
-          <a:blip r:embed="rId2">
-            <a:extLst>
-              <a:ext uri="{28A0092B-C50C-407E-A947-70E740481C1C}">
-                <a14:useLocalDpi xmlns:a14="http://schemas.microsoft.com/office/drawing/2010/main" val="0"/>
-              </a:ext>
-            </a:extLst>
-          </a:blip>
-          <a:stretch>
-            <a:fillRect/>
-          </a:stretch>
-        </p:blipFill>
+        </p:nvSpPr>
         <p:spPr>
           <a:xfrm>
-            <a:off x="0" y="0"/>
-            <a:ext cx="12192000" cy="3141088"/>
+            <a:off x="338378" y="638778"/>
+            <a:ext cx="12105736" cy="712696"/>
           </a:xfrm>
           <a:prstGeom prst="rect">
             <a:avLst/>
           </a:prstGeom>
+          <a:noFill/>
         </p:spPr>
-      </p:pic>
+        <p:txBody>
+          <a:bodyPr wrap="square">
+            <a:spAutoFit/>
+          </a:bodyPr>
+          <a:lstStyle/>
+          <a:p>
+            <a:pPr>
+              <a:lnSpc>
+                <a:spcPct val="107000"/>
+              </a:lnSpc>
+              <a:spcAft>
+                <a:spcPts val="800"/>
+              </a:spcAft>
+            </a:pPr>
+            <a:r>
+              <a:rPr lang="en-CA" sz="4000" dirty="0">
+                <a:solidFill>
+                  <a:schemeClr val="bg2"/>
+                </a:solidFill>
+                <a:effectLst/>
+                <a:latin typeface="+mj-lt"/>
+                <a:ea typeface="Calibri" panose="020F0502020204030204" pitchFamily="34" charset="0"/>
+                <a:cs typeface="Times New Roman" panose="02020603050405020304" pitchFamily="18" charset="0"/>
+              </a:rPr>
+              <a:t>Accountability Or Auditing</a:t>
+            </a:r>
+          </a:p>
+        </p:txBody>
+      </p:sp>
     </p:spTree>
     <p:extLst>
       <p:ext uri="{BB962C8B-B14F-4D97-AF65-F5344CB8AC3E}">
@@ -16516,7 +16588,7 @@
                   </a:schemeClr>
                 </a:solidFill>
               </a:rPr>
-              <a:t>Methodologies used by IDS/ISP for detection:</a:t>
+              <a:t>Methodologies used by IDS/IPS for detection:</a:t>
             </a:r>
           </a:p>
         </p:txBody>
@@ -17892,6 +17964,14 @@
 <file path=ppt/slides/slide32.xml><?xml version="1.0" encoding="utf-8"?>
 <p:sld xmlns:a="http://schemas.openxmlformats.org/drawingml/2006/main" xmlns:r="http://schemas.openxmlformats.org/officeDocument/2006/relationships" xmlns:p="http://schemas.openxmlformats.org/presentationml/2006/main">
   <p:cSld>
+    <p:bg>
+      <p:bgPr>
+        <a:solidFill>
+          <a:schemeClr val="bg1"/>
+        </a:solidFill>
+        <a:effectLst/>
+      </p:bgPr>
+    </p:bg>
     <p:spTree>
       <p:nvGrpSpPr>
         <p:cNvPr id="1" name=""/>
@@ -17908,10 +17988,10 @@
       </p:grpSpPr>
       <p:sp useBgFill="1">
         <p:nvSpPr>
-          <p:cNvPr id="27" name="Rectangle 26">
+          <p:cNvPr id="38" name="Rectangle 37">
             <a:extLst>
               <a:ext uri="{FF2B5EF4-FFF2-40B4-BE49-F238E27FC236}">
-                <a16:creationId xmlns:a16="http://schemas.microsoft.com/office/drawing/2014/main" id="{990D0034-F768-41E7-85D4-F38C4DE85770}"/>
+                <a16:creationId xmlns:a16="http://schemas.microsoft.com/office/drawing/2014/main" id="{C8DD82D3-D002-45B0-B16A-82B3DA4EFDDB}"/>
               </a:ext>
               <a:ext uri="{C183D7F6-B498-43B3-948B-1728B52AA6E4}">
                 <adec:decorative xmlns:adec="http://schemas.microsoft.com/office/drawing/2017/decorative" val="1"/>
@@ -17931,77 +18011,12 @@
         </p:nvSpPr>
         <p:spPr>
           <a:xfrm>
-            <a:off x="5685" y="0"/>
-            <a:ext cx="12186315" cy="6858000"/>
+            <a:off x="3175" y="0"/>
+            <a:ext cx="12188952" cy="6858000"/>
           </a:xfrm>
           <a:prstGeom prst="rect">
             <a:avLst/>
           </a:prstGeom>
-          <a:ln>
-            <a:noFill/>
-          </a:ln>
-        </p:spPr>
-        <p:style>
-          <a:lnRef idx="2">
-            <a:schemeClr val="accent6">
-              <a:shade val="50000"/>
-            </a:schemeClr>
-          </a:lnRef>
-          <a:fillRef idx="1001">
-            <a:schemeClr val="lt1"/>
-          </a:fillRef>
-          <a:effectRef idx="0">
-            <a:schemeClr val="accent6"/>
-          </a:effectRef>
-          <a:fontRef idx="minor">
-            <a:schemeClr val="lt1"/>
-          </a:fontRef>
-        </p:style>
-        <p:txBody>
-          <a:bodyPr rtlCol="0" anchor="ctr"/>
-          <a:lstStyle/>
-          <a:p>
-            <a:pPr algn="ctr"/>
-            <a:endParaRPr lang="en-US" dirty="0"/>
-          </a:p>
-        </p:txBody>
-      </p:sp>
-      <p:sp>
-        <p:nvSpPr>
-          <p:cNvPr id="29" name="Rectangle 28">
-            <a:extLst>
-              <a:ext uri="{FF2B5EF4-FFF2-40B4-BE49-F238E27FC236}">
-                <a16:creationId xmlns:a16="http://schemas.microsoft.com/office/drawing/2014/main" id="{95B38FD6-641F-41BF-B466-C1C6366420F0}"/>
-              </a:ext>
-              <a:ext uri="{C183D7F6-B498-43B3-948B-1728B52AA6E4}">
-                <adec:decorative xmlns:adec="http://schemas.microsoft.com/office/drawing/2017/decorative" val="1"/>
-              </a:ext>
-            </a:extLst>
-          </p:cNvPr>
-          <p:cNvSpPr>
-            <a:spLocks noGrp="1" noRot="1" noChangeAspect="1" noMove="1" noResize="1" noEditPoints="1" noAdjustHandles="1" noChangeArrowheads="1" noChangeShapeType="1" noTextEdit="1"/>
-          </p:cNvSpPr>
-          <p:nvPr>
-            <p:extLst>
-              <p:ext uri="{386F3935-93C4-4BCD-93E2-E3B085C9AB24}">
-                <p16:designElem xmlns:p16="http://schemas.microsoft.com/office/powerpoint/2015/main" val="1"/>
-              </p:ext>
-            </p:extLst>
-          </p:nvPr>
-        </p:nvSpPr>
-        <p:spPr>
-          <a:xfrm>
-            <a:off x="707474" y="1238442"/>
-            <a:ext cx="3635926" cy="4355751"/>
-          </a:xfrm>
-          <a:prstGeom prst="rect">
-            <a:avLst/>
-          </a:prstGeom>
-          <a:solidFill>
-            <a:srgbClr val="000000">
-              <a:alpha val="79000"/>
-            </a:srgbClr>
-          </a:solidFill>
           <a:ln>
             <a:noFill/>
           </a:ln>
@@ -18049,22 +18064,18 @@
         </p:nvSpPr>
         <p:spPr>
           <a:xfrm>
-            <a:off x="948648" y="1419273"/>
-            <a:ext cx="3153580" cy="1358188"/>
+            <a:off x="949047" y="643466"/>
+            <a:ext cx="2771273" cy="5470463"/>
           </a:xfrm>
         </p:spPr>
         <p:txBody>
-          <a:bodyPr>
+          <a:bodyPr anchor="ctr">
             <a:normAutofit/>
           </a:bodyPr>
           <a:lstStyle/>
           <a:p>
             <a:r>
-              <a:rPr lang="en-US" sz="3300">
-                <a:solidFill>
-                  <a:srgbClr val="FFFFFF"/>
-                </a:solidFill>
-              </a:rPr>
+              <a:rPr lang="en-US" sz="3600"/>
               <a:t>Network access control</a:t>
             </a:r>
           </a:p>
@@ -18072,10 +18083,10 @@
       </p:sp>
       <p:cxnSp>
         <p:nvCxnSpPr>
-          <p:cNvPr id="31" name="Straight Connector 30">
+          <p:cNvPr id="40" name="Straight Connector 39">
             <a:extLst>
               <a:ext uri="{FF2B5EF4-FFF2-40B4-BE49-F238E27FC236}">
-                <a16:creationId xmlns:a16="http://schemas.microsoft.com/office/drawing/2014/main" id="{6BF9119E-766E-4526-AAE5-639F577C0493}"/>
+                <a16:creationId xmlns:a16="http://schemas.microsoft.com/office/drawing/2014/main" id="{9F09C252-16FE-4557-AD6D-BB5CA773496C}"/>
               </a:ext>
               <a:ext uri="{C183D7F6-B498-43B3-948B-1728B52AA6E4}">
                 <adec:decorative xmlns:adec="http://schemas.microsoft.com/office/drawing/2017/decorative" val="1"/>
@@ -18095,16 +18106,17 @@
         </p:nvCxnSpPr>
         <p:spPr>
           <a:xfrm>
-            <a:off x="1038277" y="2865016"/>
-            <a:ext cx="2926080" cy="0"/>
+            <a:off x="4042053" y="1778497"/>
+            <a:ext cx="0" cy="3200400"/>
           </a:xfrm>
           <a:prstGeom prst="line">
             <a:avLst/>
           </a:prstGeom>
           <a:ln w="19050">
             <a:solidFill>
-              <a:schemeClr val="accent1"/>
+              <a:schemeClr val="tx1"/>
             </a:solidFill>
+            <a:miter lim="800000"/>
           </a:ln>
         </p:spPr>
         <p:style>
@@ -18140,83 +18152,22 @@
         </p:nvSpPr>
         <p:spPr>
           <a:xfrm>
-            <a:off x="948648" y="2978254"/>
-            <a:ext cx="3153580" cy="2444238"/>
+            <a:off x="4428565" y="643466"/>
+            <a:ext cx="6818427" cy="5470462"/>
           </a:xfrm>
         </p:spPr>
         <p:txBody>
-          <a:bodyPr>
+          <a:bodyPr anchor="ctr">
             <a:normAutofit/>
           </a:bodyPr>
           <a:lstStyle/>
           <a:p>
             <a:r>
-              <a:rPr lang="en-US" sz="1600">
-                <a:solidFill>
-                  <a:srgbClr val="FFFFFF"/>
-                </a:solidFill>
-              </a:rPr>
+              <a:rPr lang="en-US"/>
               <a:t>Used to check remote access device based on its criteria, if it doesn’t meet a specific criteria access is denied.</a:t>
             </a:r>
           </a:p>
         </p:txBody>
-      </p:sp>
-      <p:sp>
-        <p:nvSpPr>
-          <p:cNvPr id="33" name="!!footer rectangle">
-            <a:extLst>
-              <a:ext uri="{FF2B5EF4-FFF2-40B4-BE49-F238E27FC236}">
-                <a16:creationId xmlns:a16="http://schemas.microsoft.com/office/drawing/2014/main" id="{1FE461C7-FF45-427F-83D7-18DFBD48188D}"/>
-              </a:ext>
-              <a:ext uri="{C183D7F6-B498-43B3-948B-1728B52AA6E4}">
-                <adec:decorative xmlns:adec="http://schemas.microsoft.com/office/drawing/2017/decorative" val="1"/>
-              </a:ext>
-            </a:extLst>
-          </p:cNvPr>
-          <p:cNvSpPr>
-            <a:spLocks noGrp="1" noRot="1" noChangeAspect="1" noMove="1" noResize="1" noEditPoints="1" noAdjustHandles="1" noChangeArrowheads="1" noChangeShapeType="1" noTextEdit="1"/>
-          </p:cNvSpPr>
-          <p:nvPr>
-            <p:extLst>
-              <p:ext uri="{386F3935-93C4-4BCD-93E2-E3B085C9AB24}">
-                <p16:designElem xmlns:p16="http://schemas.microsoft.com/office/powerpoint/2015/main" val="1"/>
-              </p:ext>
-            </p:extLst>
-          </p:nvPr>
-        </p:nvSpPr>
-        <p:spPr>
-          <a:xfrm>
-            <a:off x="1" y="6400800"/>
-            <a:ext cx="12192000" cy="457200"/>
-          </a:xfrm>
-          <a:prstGeom prst="rect">
-            <a:avLst/>
-          </a:prstGeom>
-          <a:solidFill>
-            <a:srgbClr val="262626">
-              <a:alpha val="95000"/>
-            </a:srgbClr>
-          </a:solidFill>
-          <a:ln>
-            <a:noFill/>
-          </a:ln>
-        </p:spPr>
-        <p:style>
-          <a:lnRef idx="2">
-            <a:schemeClr val="accent1">
-              <a:shade val="50000"/>
-            </a:schemeClr>
-          </a:lnRef>
-          <a:fillRef idx="1">
-            <a:schemeClr val="accent1"/>
-          </a:fillRef>
-          <a:effectRef idx="0">
-            <a:schemeClr val="accent1"/>
-          </a:effectRef>
-          <a:fontRef idx="minor">
-            <a:schemeClr val="lt1"/>
-          </a:fontRef>
-        </p:style>
       </p:sp>
     </p:spTree>
     <p:extLst>
@@ -19252,7 +19203,7 @@
           <a:lstStyle/>
           <a:p>
             <a:r>
-              <a:rPr lang="en-US" dirty="0">
+              <a:rPr lang="en-US" sz="2400" dirty="0">
                 <a:solidFill>
                   <a:schemeClr val="bg1">
                     <a:lumMod val="95000"/>
@@ -19262,7 +19213,7 @@
               <a:t>Ensure that a user can </a:t>
             </a:r>
             <a:r>
-              <a:rPr lang="en-US" b="1" dirty="0">
+              <a:rPr lang="en-US" sz="2400" b="1" dirty="0">
                 <a:solidFill>
                   <a:schemeClr val="bg1">
                     <a:lumMod val="95000"/>
@@ -19272,7 +19223,7 @@
               <a:t>ACCESS</a:t>
             </a:r>
             <a:r>
-              <a:rPr lang="en-US" dirty="0">
+              <a:rPr lang="en-US" sz="2400" dirty="0">
                 <a:solidFill>
                   <a:schemeClr val="bg1">
                     <a:lumMod val="95000"/>
@@ -19282,7 +19233,7 @@
               <a:t> only </a:t>
             </a:r>
             <a:r>
-              <a:rPr lang="en-US" b="1" dirty="0">
+              <a:rPr lang="en-US" sz="2400" b="1" dirty="0">
                 <a:solidFill>
                   <a:schemeClr val="bg1">
                     <a:lumMod val="95000"/>
@@ -19292,7 +19243,7 @@
               <a:t>SPECIFIC INFORMATION </a:t>
             </a:r>
             <a:r>
-              <a:rPr lang="en-US" dirty="0">
+              <a:rPr lang="en-US" sz="2400" dirty="0">
                 <a:solidFill>
                   <a:schemeClr val="bg1">
                     <a:lumMod val="95000"/>
@@ -19302,7 +19253,7 @@
               <a:t>or </a:t>
             </a:r>
             <a:r>
-              <a:rPr lang="en-US" b="1" dirty="0">
+              <a:rPr lang="en-US" sz="2400" b="1" dirty="0">
                 <a:solidFill>
                   <a:schemeClr val="bg1">
                     <a:lumMod val="95000"/>
@@ -19312,7 +19263,7 @@
               <a:t>SPECIFIC CONTROL</a:t>
             </a:r>
             <a:r>
-              <a:rPr lang="en-US" dirty="0">
+              <a:rPr lang="en-US" sz="2400" dirty="0">
                 <a:solidFill>
                   <a:schemeClr val="bg1">
                     <a:lumMod val="95000"/>
@@ -19334,7 +19285,22 @@
                   </a:schemeClr>
                 </a:solidFill>
               </a:rPr>
-              <a:t> Controls such as –</a:t>
+              <a:t> </a:t>
+            </a:r>
+          </a:p>
+          <a:p>
+            <a:pPr marL="0" indent="0">
+              <a:buNone/>
+            </a:pPr>
+            <a:r>
+              <a:rPr lang="en-US" dirty="0">
+                <a:solidFill>
+                  <a:schemeClr val="bg1">
+                    <a:lumMod val="95000"/>
+                  </a:schemeClr>
+                </a:solidFill>
+              </a:rPr>
+              <a:t>Controls such as –</a:t>
             </a:r>
           </a:p>
           <a:p>
@@ -19929,7 +19895,7 @@
         <p:spPr>
           <a:xfrm>
             <a:off x="931653" y="618301"/>
-            <a:ext cx="10379475" cy="2062103"/>
+            <a:ext cx="10379475" cy="3046988"/>
           </a:xfrm>
           <a:prstGeom prst="rect">
             <a:avLst/>
@@ -19943,15 +19909,12 @@
           <a:lstStyle/>
           <a:p>
             <a:r>
-              <a:rPr lang="en-CA" sz="3200" b="1" u="sng" dirty="0">
-                <a:solidFill>
-                  <a:schemeClr val="accent4">
-                    <a:lumMod val="60000"/>
-                    <a:lumOff val="40000"/>
-                  </a:schemeClr>
+              <a:rPr lang="en-CA" sz="3200" dirty="0">
+                <a:solidFill>
+                  <a:schemeClr val="bg1"/>
                 </a:solidFill>
                 <a:effectLst/>
-                <a:latin typeface="Times New Roman" panose="02020603050405020304" pitchFamily="18" charset="0"/>
+                <a:latin typeface="+mj-lt"/>
                 <a:ea typeface="Times New Roman" panose="02020603050405020304" pitchFamily="18" charset="0"/>
               </a:rPr>
               <a:t>Identification – </a:t>
@@ -19960,55 +19923,56 @@
           <a:p>
             <a:endParaRPr lang="en-CA" sz="3200" b="1" u="sng" dirty="0">
               <a:solidFill>
-                <a:schemeClr val="accent4">
-                  <a:lumMod val="60000"/>
-                  <a:lumOff val="40000"/>
-                </a:schemeClr>
+                <a:schemeClr val="bg1"/>
               </a:solidFill>
-              <a:latin typeface="Times New Roman" panose="02020603050405020304" pitchFamily="18" charset="0"/>
               <a:ea typeface="Times New Roman" panose="02020603050405020304" pitchFamily="18" charset="0"/>
             </a:endParaRPr>
           </a:p>
           <a:p>
-            <a:r>
-              <a:rPr lang="en-CA" sz="3200" b="0" u="sng" dirty="0">
-                <a:solidFill>
-                  <a:schemeClr val="accent4">
-                    <a:lumMod val="60000"/>
-                    <a:lumOff val="40000"/>
-                  </a:schemeClr>
-                </a:solidFill>
-                <a:effectLst/>
-                <a:latin typeface="Times New Roman" panose="02020603050405020304" pitchFamily="18" charset="0"/>
-                <a:ea typeface="Times New Roman" panose="02020603050405020304" pitchFamily="18" charset="0"/>
-              </a:rPr>
-              <a:t>Identification is the starting point, where the users provide </a:t>
-            </a:r>
-          </a:p>
-          <a:p>
-            <a:r>
-              <a:rPr lang="en-CA" sz="3200" b="0" u="sng" dirty="0">
-                <a:solidFill>
-                  <a:schemeClr val="accent4">
-                    <a:lumMod val="60000"/>
-                    <a:lumOff val="40000"/>
-                  </a:schemeClr>
-                </a:solidFill>
-                <a:effectLst/>
-                <a:latin typeface="Times New Roman" panose="02020603050405020304" pitchFamily="18" charset="0"/>
-                <a:ea typeface="Times New Roman" panose="02020603050405020304" pitchFamily="18" charset="0"/>
-              </a:rPr>
-              <a:t>information about their identity. </a:t>
-            </a:r>
             <a:endParaRPr lang="en-CA" sz="3200" b="1" u="sng" dirty="0">
               <a:solidFill>
-                <a:schemeClr val="accent4">
-                  <a:lumMod val="60000"/>
-                  <a:lumOff val="40000"/>
-                </a:schemeClr>
+                <a:schemeClr val="bg1"/>
               </a:solidFill>
               <a:effectLst/>
-              <a:latin typeface="Times New Roman" panose="02020603050405020304" pitchFamily="18" charset="0"/>
+              <a:ea typeface="Times New Roman" panose="02020603050405020304" pitchFamily="18" charset="0"/>
+            </a:endParaRPr>
+          </a:p>
+          <a:p>
+            <a:endParaRPr lang="en-CA" sz="3200" b="1" u="sng" dirty="0">
+              <a:solidFill>
+                <a:schemeClr val="bg1"/>
+              </a:solidFill>
+              <a:ea typeface="Times New Roman" panose="02020603050405020304" pitchFamily="18" charset="0"/>
+            </a:endParaRPr>
+          </a:p>
+          <a:p>
+            <a:r>
+              <a:rPr lang="en-CA" sz="3200" b="0" dirty="0">
+                <a:solidFill>
+                  <a:schemeClr val="bg1"/>
+                </a:solidFill>
+                <a:effectLst/>
+                <a:ea typeface="Times New Roman" panose="02020603050405020304" pitchFamily="18" charset="0"/>
+              </a:rPr>
+              <a:t>Identification is the starting point, where the users provide </a:t>
+            </a:r>
+          </a:p>
+          <a:p>
+            <a:r>
+              <a:rPr lang="en-CA" sz="3200" b="0" dirty="0">
+                <a:solidFill>
+                  <a:schemeClr val="bg1"/>
+                </a:solidFill>
+                <a:effectLst/>
+                <a:ea typeface="Times New Roman" panose="02020603050405020304" pitchFamily="18" charset="0"/>
+              </a:rPr>
+              <a:t>information about their identity. </a:t>
+            </a:r>
+            <a:endParaRPr lang="en-CA" sz="3200" b="1" dirty="0">
+              <a:solidFill>
+                <a:schemeClr val="bg1"/>
+              </a:solidFill>
+              <a:effectLst/>
               <a:ea typeface="Times New Roman" panose="02020603050405020304" pitchFamily="18" charset="0"/>
             </a:endParaRPr>
           </a:p>
@@ -22213,27 +22177,27 @@
           <a:lstStyle/>
           <a:p>
             <a:r>
-              <a:rPr lang="en-CA" sz="2800" b="1" dirty="0">
+              <a:rPr lang="en-CA" sz="2800" dirty="0">
                 <a:solidFill>
                   <a:schemeClr val="bg1">
                     <a:lumMod val="95000"/>
                   </a:schemeClr>
                 </a:solidFill>
                 <a:effectLst/>
-                <a:latin typeface="Times New Roman" panose="02020603050405020304" pitchFamily="18" charset="0"/>
+                <a:latin typeface="+mj-lt"/>
                 <a:ea typeface="Times New Roman" panose="02020603050405020304" pitchFamily="18" charset="0"/>
               </a:rPr>
               <a:t>Authentication </a:t>
             </a:r>
             <a:r>
-              <a:rPr lang="en-CA" sz="2000" b="1" dirty="0">
+              <a:rPr lang="en-CA" sz="2000" dirty="0">
                 <a:solidFill>
                   <a:schemeClr val="bg1">
                     <a:lumMod val="95000"/>
                   </a:schemeClr>
                 </a:solidFill>
                 <a:effectLst/>
-                <a:latin typeface="Times New Roman" panose="02020603050405020304" pitchFamily="18" charset="0"/>
+                <a:latin typeface="+mj-lt"/>
                 <a:ea typeface="Times New Roman" panose="02020603050405020304" pitchFamily="18" charset="0"/>
               </a:rPr>
               <a:t>– </a:t>
@@ -22259,33 +22223,30 @@
               <a:solidFill>
                 <a:schemeClr val="bg2"/>
               </a:solidFill>
-              <a:latin typeface="Times New Roman" panose="02020603050405020304" pitchFamily="18" charset="0"/>
               <a:ea typeface="Times New Roman" panose="02020603050405020304" pitchFamily="18" charset="0"/>
             </a:endParaRPr>
           </a:p>
           <a:p>
             <a:r>
-              <a:rPr lang="en-CA" sz="2000" u="sng" dirty="0">
+              <a:rPr lang="en-CA" sz="2000" dirty="0">
                 <a:solidFill>
                   <a:schemeClr val="bg1">
                     <a:lumMod val="95000"/>
                   </a:schemeClr>
                 </a:solidFill>
                 <a:effectLst/>
-                <a:latin typeface="Times New Roman" panose="02020603050405020304" pitchFamily="18" charset="0"/>
                 <a:ea typeface="Times New Roman" panose="02020603050405020304" pitchFamily="18" charset="0"/>
               </a:rPr>
               <a:t>Entering a password, using a digital or physical key, and providing a </a:t>
             </a:r>
             <a:r>
-              <a:rPr lang="en-CA" sz="2000" u="sng" strike="noStrike" dirty="0">
+              <a:rPr lang="en-CA" sz="2000" strike="noStrike" dirty="0">
                 <a:solidFill>
                   <a:schemeClr val="bg1">
                     <a:lumMod val="95000"/>
                   </a:schemeClr>
                 </a:solidFill>
                 <a:effectLst/>
-                <a:latin typeface="Times New Roman" panose="02020603050405020304" pitchFamily="18" charset="0"/>
                 <a:ea typeface="Times New Roman" panose="02020603050405020304" pitchFamily="18" charset="0"/>
                 <a:hlinkClick r:id="rId2">
                   <a:extLst>
@@ -22298,52 +22259,48 @@
               <a:t>biometric </a:t>
             </a:r>
             <a:r>
-              <a:rPr lang="en-CA" sz="2000" u="sng" dirty="0">
+              <a:rPr lang="en-CA" sz="2000" dirty="0">
                 <a:solidFill>
                   <a:schemeClr val="bg1">
                     <a:lumMod val="95000"/>
                   </a:schemeClr>
                 </a:solidFill>
                 <a:effectLst/>
-                <a:latin typeface="Times New Roman" panose="02020603050405020304" pitchFamily="18" charset="0"/>
                 <a:ea typeface="Times New Roman" panose="02020603050405020304" pitchFamily="18" charset="0"/>
               </a:rPr>
               <a:t>measure for accuracy are some of the ways to do this effectively.</a:t>
             </a:r>
           </a:p>
           <a:p>
-            <a:endParaRPr lang="en-CA" sz="2000" u="sng" dirty="0">
+            <a:endParaRPr lang="en-CA" sz="2000" dirty="0">
               <a:solidFill>
                 <a:schemeClr val="bg1">
                   <a:lumMod val="95000"/>
                 </a:schemeClr>
               </a:solidFill>
-              <a:latin typeface="Times New Roman" panose="02020603050405020304" pitchFamily="18" charset="0"/>
               <a:ea typeface="Times New Roman" panose="02020603050405020304" pitchFamily="18" charset="0"/>
             </a:endParaRPr>
           </a:p>
           <a:p>
-            <a:endParaRPr lang="en-CA" sz="2000" u="sng" dirty="0">
+            <a:endParaRPr lang="en-CA" sz="2000" dirty="0">
               <a:solidFill>
                 <a:schemeClr val="bg1">
                   <a:lumMod val="95000"/>
                 </a:schemeClr>
               </a:solidFill>
               <a:effectLst/>
-              <a:latin typeface="Times New Roman" panose="02020603050405020304" pitchFamily="18" charset="0"/>
               <a:ea typeface="Times New Roman" panose="02020603050405020304" pitchFamily="18" charset="0"/>
             </a:endParaRPr>
           </a:p>
           <a:p>
             <a:r>
-              <a:rPr lang="en-CA" sz="2000" u="sng" dirty="0">
+              <a:rPr lang="en-CA" sz="2000" dirty="0">
                 <a:solidFill>
                   <a:schemeClr val="bg1">
                     <a:lumMod val="95000"/>
                   </a:schemeClr>
                 </a:solidFill>
                 <a:effectLst/>
-                <a:latin typeface="Times New Roman" panose="02020603050405020304" pitchFamily="18" charset="0"/>
                 <a:ea typeface="Times New Roman" panose="02020603050405020304" pitchFamily="18" charset="0"/>
               </a:rPr>
               <a:t>The disadvantage of using this method is that once the information is lost or stolen (for example, if a user’s password is stolen), an attacker would be able to successfully authenticate.</a:t>
@@ -22403,21 +22360,29 @@
           <a:lstStyle/>
           <a:p>
             <a:r>
-              <a:rPr lang="en-CA" sz="4400" b="1" dirty="0">
+              <a:rPr lang="en-CA" sz="4400" dirty="0">
+                <a:solidFill>
+                  <a:schemeClr val="bg1"/>
+                </a:solidFill>
                 <a:effectLst/>
-                <a:latin typeface="Times New Roman" panose="02020603050405020304" pitchFamily="18" charset="0"/>
                 <a:ea typeface="Times New Roman" panose="02020603050405020304" pitchFamily="18" charset="0"/>
               </a:rPr>
               <a:t>Authentication by Knowledge – </a:t>
             </a:r>
             <a:br>
               <a:rPr lang="en-CA" sz="1800" dirty="0">
+                <a:solidFill>
+                  <a:schemeClr val="bg1"/>
+                </a:solidFill>
                 <a:effectLst/>
-                <a:latin typeface="Times New Roman" panose="02020603050405020304" pitchFamily="18" charset="0"/>
                 <a:ea typeface="Times New Roman" panose="02020603050405020304" pitchFamily="18" charset="0"/>
               </a:rPr>
             </a:br>
-            <a:endParaRPr lang="en-CA" dirty="0"/>
+            <a:endParaRPr lang="en-CA" dirty="0">
+              <a:solidFill>
+                <a:schemeClr val="bg1"/>
+              </a:solidFill>
+            </a:endParaRPr>
           </a:p>
         </p:txBody>
       </p:sp>
@@ -22439,70 +22404,34 @@
         </p:nvSpPr>
         <p:spPr/>
         <p:txBody>
-          <a:bodyPr/>
+          <a:bodyPr>
+            <a:normAutofit/>
+          </a:bodyPr>
           <a:lstStyle/>
           <a:p>
             <a:r>
-              <a:rPr lang="en-CA" sz="1800" dirty="0">
+              <a:rPr lang="en-CA" sz="2400" dirty="0">
                 <a:solidFill>
                   <a:schemeClr val="bg2"/>
                 </a:solidFill>
                 <a:effectLst/>
-                <a:latin typeface="Times New Roman" panose="02020603050405020304" pitchFamily="18" charset="0"/>
                 <a:ea typeface="Times New Roman" panose="02020603050405020304" pitchFamily="18" charset="0"/>
               </a:rPr>
               <a:t>When the user offers a secret that only they know, that is known-only authentication by knowledge. A password, PIN code, or security question provided by the user would be examples of knowledge-based authentication</a:t>
             </a:r>
             <a:r>
-              <a:rPr lang="en-CA" sz="1800" dirty="0">
+              <a:rPr lang="en-CA" sz="2400" dirty="0">
                 <a:effectLst/>
-                <a:latin typeface="Times New Roman" panose="02020603050405020304" pitchFamily="18" charset="0"/>
                 <a:ea typeface="Times New Roman" panose="02020603050405020304" pitchFamily="18" charset="0"/>
               </a:rPr>
               <a:t>.</a:t>
             </a:r>
           </a:p>
           <a:p>
-            <a:endParaRPr lang="en-CA" dirty="0"/>
+            <a:endParaRPr lang="en-CA" sz="2400" dirty="0"/>
           </a:p>
         </p:txBody>
       </p:sp>
-      <p:pic>
-        <p:nvPicPr>
-          <p:cNvPr id="4" name="Picture 3" descr="Logo, company name&#10;&#10;Description automatically generated">
-            <a:extLst>
-              <a:ext uri="{FF2B5EF4-FFF2-40B4-BE49-F238E27FC236}">
-                <a16:creationId xmlns:a16="http://schemas.microsoft.com/office/drawing/2014/main" id="{F5B40B1E-49F7-1EDB-E047-4A662C78E836}"/>
-              </a:ext>
-            </a:extLst>
-          </p:cNvPr>
-          <p:cNvPicPr>
-            <a:picLocks noChangeAspect="1"/>
-          </p:cNvPicPr>
-          <p:nvPr/>
-        </p:nvPicPr>
-        <p:blipFill>
-          <a:blip r:embed="rId2">
-            <a:extLst>
-              <a:ext uri="{28A0092B-C50C-407E-A947-70E740481C1C}">
-                <a14:useLocalDpi xmlns:a14="http://schemas.microsoft.com/office/drawing/2010/main" val="0"/>
-              </a:ext>
-            </a:extLst>
-          </a:blip>
-          <a:stretch>
-            <a:fillRect/>
-          </a:stretch>
-        </p:blipFill>
-        <p:spPr>
-          <a:xfrm>
-            <a:off x="310550" y="3062377"/>
-            <a:ext cx="11792309" cy="3364302"/>
-          </a:xfrm>
-          <a:prstGeom prst="rect">
-            <a:avLst/>
-          </a:prstGeom>
-        </p:spPr>
-      </p:pic>
     </p:spTree>
     <p:extLst>
       <p:ext uri="{BB962C8B-B14F-4D97-AF65-F5344CB8AC3E}">
@@ -22548,7 +22477,7 @@
         <p:spPr>
           <a:xfrm>
             <a:off x="362309" y="428179"/>
-            <a:ext cx="8779534" cy="5663089"/>
+            <a:ext cx="8779534" cy="5416868"/>
           </a:xfrm>
           <a:prstGeom prst="rect">
             <a:avLst/>
@@ -22569,7 +22498,6 @@
                   </a:schemeClr>
                 </a:solidFill>
                 <a:effectLst/>
-                <a:latin typeface="Times New Roman" panose="02020603050405020304" pitchFamily="18" charset="0"/>
                 <a:ea typeface="Times New Roman" panose="02020603050405020304" pitchFamily="18" charset="0"/>
               </a:rPr>
               <a:t>Authorization – </a:t>
@@ -22582,7 +22510,6 @@
                   </a:schemeClr>
                 </a:solidFill>
                 <a:effectLst/>
-                <a:latin typeface="Times New Roman" panose="02020603050405020304" pitchFamily="18" charset="0"/>
                 <a:ea typeface="Times New Roman" panose="02020603050405020304" pitchFamily="18" charset="0"/>
               </a:rPr>
               <a:t> </a:t>
@@ -22595,7 +22522,6 @@
                   </a:schemeClr>
                 </a:solidFill>
                 <a:effectLst/>
-                <a:latin typeface="Times New Roman" panose="02020603050405020304" pitchFamily="18" charset="0"/>
                 <a:ea typeface="Times New Roman" panose="02020603050405020304" pitchFamily="18" charset="0"/>
               </a:rPr>
               <a:t>When a user has successfully established their identity, pre-determined permissions are granted to them during the authorization stage. </a:t>
@@ -22608,7 +22534,6 @@
                   <a:lumMod val="95000"/>
                 </a:schemeClr>
               </a:solidFill>
-              <a:latin typeface="Times New Roman" panose="02020603050405020304" pitchFamily="18" charset="0"/>
               <a:ea typeface="Times New Roman" panose="02020603050405020304" pitchFamily="18" charset="0"/>
             </a:endParaRPr>
           </a:p>
@@ -22620,7 +22545,6 @@
                     <a:lumMod val="95000"/>
                   </a:schemeClr>
                 </a:solidFill>
-                <a:latin typeface="Times New Roman" panose="02020603050405020304" pitchFamily="18" charset="0"/>
                 <a:ea typeface="Times New Roman" panose="02020603050405020304" pitchFamily="18" charset="0"/>
               </a:rPr>
               <a:t>How to prevent access  – </a:t>
@@ -22634,7 +22558,6 @@
                 </a:schemeClr>
               </a:solidFill>
               <a:effectLst/>
-              <a:latin typeface="Times New Roman" panose="02020603050405020304" pitchFamily="18" charset="0"/>
               <a:ea typeface="Times New Roman" panose="02020603050405020304" pitchFamily="18" charset="0"/>
             </a:endParaRPr>
           </a:p>
@@ -22651,7 +22574,6 @@
                   </a:schemeClr>
                 </a:solidFill>
                 <a:effectLst/>
-                <a:latin typeface="Times New Roman" panose="02020603050405020304" pitchFamily="18" charset="0"/>
                 <a:ea typeface="Times New Roman" panose="02020603050405020304" pitchFamily="18" charset="0"/>
               </a:rPr>
               <a:t>Default access privileges will be set to default deny (deny all). </a:t>
@@ -22669,7 +22591,6 @@
                 </a:schemeClr>
               </a:solidFill>
               <a:effectLst/>
-              <a:latin typeface="Times New Roman" panose="02020603050405020304" pitchFamily="18" charset="0"/>
               <a:ea typeface="Times New Roman" panose="02020603050405020304" pitchFamily="18" charset="0"/>
             </a:endParaRPr>
           </a:p>
@@ -22686,7 +22607,6 @@
                   </a:schemeClr>
                 </a:solidFill>
                 <a:effectLst/>
-                <a:latin typeface="Times New Roman" panose="02020603050405020304" pitchFamily="18" charset="0"/>
                 <a:ea typeface="Times New Roman" panose="02020603050405020304" pitchFamily="18" charset="0"/>
               </a:rPr>
               <a:t>Access to information and information systems must be limited to personnel and processes with a need-to-know to effectively fulfill their duties.</a:t>
@@ -22704,7 +22624,6 @@
                 </a:schemeClr>
               </a:solidFill>
               <a:effectLst/>
-              <a:latin typeface="Times New Roman" panose="02020603050405020304" pitchFamily="18" charset="0"/>
               <a:ea typeface="Times New Roman" panose="02020603050405020304" pitchFamily="18" charset="0"/>
             </a:endParaRPr>
           </a:p>
@@ -22721,7 +22640,6 @@
                   </a:schemeClr>
                 </a:solidFill>
                 <a:effectLst/>
-                <a:latin typeface="Times New Roman" panose="02020603050405020304" pitchFamily="18" charset="0"/>
                 <a:ea typeface="Times New Roman" panose="02020603050405020304" pitchFamily="18" charset="0"/>
               </a:rPr>
               <a:t>Access permissions must be based on the minimum required to perform the</a:t>
@@ -22733,7 +22651,6 @@
                 </a:schemeClr>
               </a:solidFill>
               <a:effectLst/>
-              <a:latin typeface="Times New Roman" panose="02020603050405020304" pitchFamily="18" charset="0"/>
               <a:ea typeface="Times New Roman" panose="02020603050405020304" pitchFamily="18" charset="0"/>
             </a:endParaRPr>
           </a:p>
@@ -22747,7 +22664,6 @@
                   </a:schemeClr>
                 </a:solidFill>
                 <a:effectLst/>
-                <a:latin typeface="Times New Roman" panose="02020603050405020304" pitchFamily="18" charset="0"/>
                 <a:ea typeface="Times New Roman" panose="02020603050405020304" pitchFamily="18" charset="0"/>
               </a:rPr>
               <a:t> job or program function. </a:t>
@@ -22762,7 +22678,6 @@
                 </a:schemeClr>
               </a:solidFill>
               <a:effectLst/>
-              <a:latin typeface="Times New Roman" panose="02020603050405020304" pitchFamily="18" charset="0"/>
               <a:ea typeface="Times New Roman" panose="02020603050405020304" pitchFamily="18" charset="0"/>
             </a:endParaRPr>
           </a:p>
@@ -22776,17 +22691,71 @@
                   </a:schemeClr>
                 </a:solidFill>
                 <a:effectLst/>
-                <a:latin typeface="Times New Roman" panose="02020603050405020304" pitchFamily="18" charset="0"/>
                 <a:ea typeface="Times New Roman" panose="02020603050405020304" pitchFamily="18" charset="0"/>
               </a:rPr>
               <a:t>4.    Information and information system owners are responsible for determining access rights and permissions.</a:t>
             </a:r>
           </a:p>
           <a:p>
-            <a:pPr marL="342900" lvl="0" indent="-342900">
-              <a:buFont typeface="+mj-lt"/>
-              <a:buAutoNum type="arabicPeriod"/>
-            </a:pPr>
+            <a:pPr lvl="0"/>
+            <a:r>
+              <a:rPr lang="en-CA" sz="1800" b="0" dirty="0">
+                <a:solidFill>
+                  <a:schemeClr val="bg1">
+                    <a:lumMod val="95000"/>
+                  </a:schemeClr>
+                </a:solidFill>
+                <a:effectLst/>
+                <a:ea typeface="Times New Roman" panose="02020603050405020304" pitchFamily="18" charset="0"/>
+              </a:rPr>
+              <a:t> </a:t>
+            </a:r>
+            <a:endParaRPr lang="en-CA" b="1" dirty="0">
+              <a:solidFill>
+                <a:schemeClr val="bg1">
+                  <a:lumMod val="95000"/>
+                </a:schemeClr>
+              </a:solidFill>
+              <a:ea typeface="Times New Roman" panose="02020603050405020304" pitchFamily="18" charset="0"/>
+            </a:endParaRPr>
+          </a:p>
+          <a:p>
+            <a:pPr lvl="0"/>
+            <a:r>
+              <a:rPr lang="en-CA" b="1" dirty="0">
+                <a:solidFill>
+                  <a:schemeClr val="bg1">
+                    <a:lumMod val="95000"/>
+                  </a:schemeClr>
+                </a:solidFill>
+                <a:ea typeface="Times New Roman" panose="02020603050405020304" pitchFamily="18" charset="0"/>
+              </a:rPr>
+              <a:t>5. </a:t>
+            </a:r>
+            <a:r>
+              <a:rPr lang="en-CA" sz="1800" b="1" dirty="0">
+                <a:solidFill>
+                  <a:schemeClr val="bg1">
+                    <a:lumMod val="95000"/>
+                  </a:schemeClr>
+                </a:solidFill>
+                <a:effectLst/>
+                <a:ea typeface="Times New Roman" panose="02020603050405020304" pitchFamily="18" charset="0"/>
+              </a:rPr>
+              <a:t> </a:t>
+            </a:r>
+            <a:r>
+              <a:rPr lang="en-CA" sz="1800" b="0" dirty="0">
+                <a:solidFill>
+                  <a:schemeClr val="bg1">
+                    <a:lumMod val="95000"/>
+                  </a:schemeClr>
+                </a:solidFill>
+                <a:effectLst/>
+                <a:ea typeface="Times New Roman" panose="02020603050405020304" pitchFamily="18" charset="0"/>
+              </a:rPr>
+              <a:t>Permissions must not be granted until the authorization process is complete.</a:t>
+            </a:r>
             <a:endParaRPr lang="en-CA" sz="1800" b="1" dirty="0">
               <a:solidFill>
                 <a:schemeClr val="bg1">
@@ -22794,99 +22763,6 @@
                 </a:schemeClr>
               </a:solidFill>
               <a:effectLst/>
-              <a:latin typeface="Times New Roman" panose="02020603050405020304" pitchFamily="18" charset="0"/>
-              <a:ea typeface="Times New Roman" panose="02020603050405020304" pitchFamily="18" charset="0"/>
-            </a:endParaRPr>
-          </a:p>
-          <a:p>
-            <a:pPr lvl="0"/>
-            <a:r>
-              <a:rPr lang="en-CA" sz="1800" b="0" dirty="0">
-                <a:solidFill>
-                  <a:schemeClr val="bg1">
-                    <a:lumMod val="95000"/>
-                  </a:schemeClr>
-                </a:solidFill>
-                <a:effectLst/>
-                <a:latin typeface="Times New Roman" panose="02020603050405020304" pitchFamily="18" charset="0"/>
-                <a:ea typeface="Times New Roman" panose="02020603050405020304" pitchFamily="18" charset="0"/>
-              </a:rPr>
-              <a:t>5.  The Office of Information Security is responsible for enforcing an authorization process.</a:t>
-            </a:r>
-          </a:p>
-          <a:p>
-            <a:pPr lvl="0"/>
-            <a:r>
-              <a:rPr lang="en-CA" sz="1800" b="0" dirty="0">
-                <a:solidFill>
-                  <a:schemeClr val="bg1">
-                    <a:lumMod val="95000"/>
-                  </a:schemeClr>
-                </a:solidFill>
-                <a:effectLst/>
-                <a:latin typeface="Times New Roman" panose="02020603050405020304" pitchFamily="18" charset="0"/>
-                <a:ea typeface="Times New Roman" panose="02020603050405020304" pitchFamily="18" charset="0"/>
-              </a:rPr>
-              <a:t> </a:t>
-            </a:r>
-            <a:endParaRPr lang="en-CA" b="1" dirty="0">
-              <a:solidFill>
-                <a:schemeClr val="bg1">
-                  <a:lumMod val="95000"/>
-                </a:schemeClr>
-              </a:solidFill>
-              <a:latin typeface="Times New Roman" panose="02020603050405020304" pitchFamily="18" charset="0"/>
-              <a:ea typeface="Times New Roman" panose="02020603050405020304" pitchFamily="18" charset="0"/>
-            </a:endParaRPr>
-          </a:p>
-          <a:p>
-            <a:pPr lvl="0"/>
-            <a:r>
-              <a:rPr lang="en-CA" b="1" dirty="0">
-                <a:solidFill>
-                  <a:schemeClr val="bg1">
-                    <a:lumMod val="95000"/>
-                  </a:schemeClr>
-                </a:solidFill>
-                <a:latin typeface="Times New Roman" panose="02020603050405020304" pitchFamily="18" charset="0"/>
-                <a:ea typeface="Times New Roman" panose="02020603050405020304" pitchFamily="18" charset="0"/>
-              </a:rPr>
-              <a:t>6. </a:t>
-            </a:r>
-            <a:r>
-              <a:rPr lang="en-CA" sz="1800" b="1" dirty="0">
-                <a:solidFill>
-                  <a:schemeClr val="bg1">
-                    <a:lumMod val="95000"/>
-                  </a:schemeClr>
-                </a:solidFill>
-                <a:effectLst/>
-                <a:latin typeface="Times New Roman" panose="02020603050405020304" pitchFamily="18" charset="0"/>
-                <a:ea typeface="Times New Roman" panose="02020603050405020304" pitchFamily="18" charset="0"/>
-              </a:rPr>
-              <a:t> </a:t>
-            </a:r>
-            <a:r>
-              <a:rPr lang="en-CA" sz="1800" b="0" dirty="0">
-                <a:solidFill>
-                  <a:schemeClr val="bg1">
-                    <a:lumMod val="95000"/>
-                  </a:schemeClr>
-                </a:solidFill>
-                <a:effectLst/>
-                <a:latin typeface="Times New Roman" panose="02020603050405020304" pitchFamily="18" charset="0"/>
-                <a:ea typeface="Times New Roman" panose="02020603050405020304" pitchFamily="18" charset="0"/>
-              </a:rPr>
-              <a:t>Permissions must not be granted until the authorization process is complete.</a:t>
-            </a:r>
-            <a:endParaRPr lang="en-CA" sz="1800" b="1" dirty="0">
-              <a:solidFill>
-                <a:schemeClr val="bg1">
-                  <a:lumMod val="95000"/>
-                </a:schemeClr>
-              </a:solidFill>
-              <a:effectLst/>
-              <a:latin typeface="Times New Roman" panose="02020603050405020304" pitchFamily="18" charset="0"/>
               <a:ea typeface="Times New Roman" panose="02020603050405020304" pitchFamily="18" charset="0"/>
             </a:endParaRPr>
           </a:p>
@@ -22940,25 +22816,35 @@
         </p:nvSpPr>
         <p:spPr/>
         <p:txBody>
-          <a:bodyPr/>
+          <a:bodyPr>
+            <a:normAutofit fontScale="90000"/>
+          </a:bodyPr>
           <a:lstStyle/>
           <a:p>
             <a:r>
-              <a:rPr lang="en-CA" sz="4000" b="1" dirty="0">
+              <a:rPr lang="en-CA" sz="4000" dirty="0">
+                <a:solidFill>
+                  <a:schemeClr val="bg1"/>
+                </a:solidFill>
                 <a:effectLst/>
-                <a:latin typeface="Times New Roman" panose="02020603050405020304" pitchFamily="18" charset="0"/>
                 <a:ea typeface="Times New Roman" panose="02020603050405020304" pitchFamily="18" charset="0"/>
               </a:rPr>
               <a:t>Authentication by Ownership or Possession –</a:t>
             </a:r>
             <a:br>
-              <a:rPr lang="en-CA" sz="1800" b="1" dirty="0">
+              <a:rPr lang="en-CA" sz="1800" dirty="0">
+                <a:solidFill>
+                  <a:schemeClr val="bg1"/>
+                </a:solidFill>
                 <a:effectLst/>
-                <a:latin typeface="Times New Roman" panose="02020603050405020304" pitchFamily="18" charset="0"/>
                 <a:ea typeface="Times New Roman" panose="02020603050405020304" pitchFamily="18" charset="0"/>
               </a:rPr>
             </a:br>
-            <a:endParaRPr lang="en-CA" dirty="0"/>
+            <a:endParaRPr lang="en-CA" dirty="0">
+              <a:solidFill>
+                <a:schemeClr val="bg1"/>
+              </a:solidFill>
+            </a:endParaRPr>
           </a:p>
         </p:txBody>
       </p:sp>
@@ -22976,8 +22862,8 @@
         </p:nvSpPr>
         <p:spPr>
           <a:xfrm>
-            <a:off x="227162" y="1258089"/>
-            <a:ext cx="11964838" cy="3970318"/>
+            <a:off x="433640" y="2172489"/>
+            <a:ext cx="11964838" cy="3046988"/>
           </a:xfrm>
           <a:prstGeom prst="rect">
             <a:avLst/>
@@ -22991,71 +22877,65 @@
           <a:lstStyle/>
           <a:p>
             <a:r>
-              <a:rPr lang="en-CA" sz="2800" b="1" dirty="0">
+              <a:rPr lang="en-CA" sz="2400" dirty="0">
                 <a:solidFill>
                   <a:schemeClr val="bg2"/>
                 </a:solidFill>
                 <a:effectLst/>
-                <a:latin typeface="Times New Roman" panose="02020603050405020304" pitchFamily="18" charset="0"/>
                 <a:ea typeface="Times New Roman" panose="02020603050405020304" pitchFamily="18" charset="0"/>
               </a:rPr>
               <a:t>With this type of authentication, the user is asked to provide proof that he owns something specific.</a:t>
             </a:r>
           </a:p>
           <a:p>
-            <a:endParaRPr lang="en-CA" sz="2800" b="1" dirty="0">
+            <a:endParaRPr lang="en-CA" sz="2400" dirty="0">
               <a:solidFill>
                 <a:schemeClr val="bg2"/>
               </a:solidFill>
               <a:effectLst/>
-              <a:latin typeface="Times New Roman" panose="02020603050405020304" pitchFamily="18" charset="0"/>
               <a:ea typeface="Times New Roman" panose="02020603050405020304" pitchFamily="18" charset="0"/>
             </a:endParaRPr>
           </a:p>
           <a:p>
             <a:r>
-              <a:rPr lang="en-CA" sz="2800" b="1" dirty="0">
+              <a:rPr lang="en-CA" sz="2400" dirty="0">
                 <a:solidFill>
                   <a:schemeClr val="bg2"/>
                 </a:solidFill>
                 <a:effectLst/>
-                <a:latin typeface="Times New Roman" panose="02020603050405020304" pitchFamily="18" charset="0"/>
                 <a:ea typeface="Times New Roman" panose="02020603050405020304" pitchFamily="18" charset="0"/>
               </a:rPr>
               <a:t>—for example, a system might require an employee to use a badge to access a facility. Another example of authentication by ownership is the use of a token or smart card.</a:t>
             </a:r>
           </a:p>
           <a:p>
-            <a:endParaRPr lang="en-CA" sz="2800" b="1" dirty="0">
+            <a:endParaRPr lang="en-CA" sz="2400" dirty="0">
               <a:solidFill>
                 <a:schemeClr val="bg2"/>
               </a:solidFill>
               <a:effectLst/>
-              <a:latin typeface="Times New Roman" panose="02020603050405020304" pitchFamily="18" charset="0"/>
               <a:ea typeface="Times New Roman" panose="02020603050405020304" pitchFamily="18" charset="0"/>
             </a:endParaRPr>
           </a:p>
           <a:p>
             <a:r>
-              <a:rPr lang="en-CA" sz="2800" b="1" dirty="0">
+              <a:rPr lang="en-CA" sz="2400" dirty="0">
                 <a:solidFill>
                   <a:schemeClr val="bg2"/>
                 </a:solidFill>
                 <a:effectLst/>
-                <a:latin typeface="Times New Roman" panose="02020603050405020304" pitchFamily="18" charset="0"/>
                 <a:ea typeface="Times New Roman" panose="02020603050405020304" pitchFamily="18" charset="0"/>
               </a:rPr>
               <a:t>Possession – The most common of the four is the one-time passcode sent to a device in the user’s possession</a:t>
             </a:r>
             <a:r>
-              <a:rPr lang="en-CA" sz="2000" b="1" dirty="0">
+              <a:rPr lang="en-CA" sz="2400" dirty="0">
                 <a:solidFill>
                   <a:schemeClr val="bg2">
                     <a:lumMod val="10000"/>
                   </a:schemeClr>
                 </a:solidFill>
                 <a:effectLst/>
-                <a:latin typeface="Times New Roman" panose="02020603050405020304" pitchFamily="18" charset="0"/>
                 <a:ea typeface="Times New Roman" panose="02020603050405020304" pitchFamily="18" charset="0"/>
               </a:rPr>
               <a:t>.</a:t>

</xml_diff>